<commit_message>
Update readme and PP.
</commit_message>
<xml_diff>
--- a/Giving Back.pptx
+++ b/Giving Back.pptx
@@ -16,9 +16,10 @@
     <p:sldId id="278" r:id="rId10"/>
     <p:sldId id="271" r:id="rId11"/>
     <p:sldId id="272" r:id="rId12"/>
-    <p:sldId id="276" r:id="rId13"/>
-    <p:sldId id="277" r:id="rId14"/>
-    <p:sldId id="258" r:id="rId15"/>
+    <p:sldId id="280" r:id="rId13"/>
+    <p:sldId id="276" r:id="rId14"/>
+    <p:sldId id="277" r:id="rId15"/>
+    <p:sldId id="258" r:id="rId16"/>
   </p:sldIdLst>
   <p:sldSz cx="12192000" cy="6858000"/>
   <p:notesSz cx="6858000" cy="9144000"/>
@@ -6717,7 +6718,7 @@
           <a:p>
             <a:r>
               <a:rPr lang="en-US" dirty="0"/>
-              <a:t>WHAT WOULD YOU DO?</a:t>
+              <a:t>WAYS TO GIVE BACK</a:t>
             </a:r>
           </a:p>
         </p:txBody>
@@ -6736,8 +6737,8 @@
         </p:nvSpPr>
         <p:spPr>
           <a:xfrm>
-            <a:off x="839585" y="2044931"/>
-            <a:ext cx="10532226" cy="1523494"/>
+            <a:off x="829887" y="2077883"/>
+            <a:ext cx="10532226" cy="3431709"/>
           </a:xfrm>
           <a:prstGeom prst="rect">
             <a:avLst/>
@@ -6756,7 +6757,7 @@
             </a:pPr>
             <a:r>
               <a:rPr lang="en-US" sz="3100" dirty="0"/>
-              <a:t>It’s not me, it’s YOU!</a:t>
+              <a:t>Report bugs</a:t>
             </a:r>
           </a:p>
           <a:p>
@@ -6766,8 +6767,45 @@
             </a:pPr>
             <a:r>
               <a:rPr lang="en-US" sz="3100" dirty="0"/>
-              <a:t>Are you like me?</a:t>
-            </a:r>
+              <a:t>Feedback</a:t>
+            </a:r>
+          </a:p>
+          <a:p>
+            <a:pPr marL="457200" indent="-457200">
+              <a:buFont typeface="Arial" panose="020B0604020202020204" pitchFamily="34" charset="0"/>
+              <a:buChar char="•"/>
+            </a:pPr>
+            <a:r>
+              <a:rPr lang="en-US" sz="3100" dirty="0"/>
+              <a:t>Mentor</a:t>
+            </a:r>
+          </a:p>
+          <a:p>
+            <a:pPr marL="457200" indent="-457200">
+              <a:buFont typeface="Arial" panose="020B0604020202020204" pitchFamily="34" charset="0"/>
+              <a:buChar char="•"/>
+            </a:pPr>
+            <a:r>
+              <a:rPr lang="en-US" sz="3100" dirty="0"/>
+              <a:t>Talks</a:t>
+            </a:r>
+          </a:p>
+          <a:p>
+            <a:pPr marL="457200" indent="-457200">
+              <a:buFont typeface="Arial" panose="020B0604020202020204" pitchFamily="34" charset="0"/>
+              <a:buChar char="•"/>
+            </a:pPr>
+            <a:r>
+              <a:rPr lang="en-US" sz="3100" dirty="0"/>
+              <a:t>Free Stuff</a:t>
+            </a:r>
+          </a:p>
+          <a:p>
+            <a:pPr marL="457200" indent="-457200">
+              <a:buFont typeface="Arial" panose="020B0604020202020204" pitchFamily="34" charset="0"/>
+              <a:buChar char="•"/>
+            </a:pPr>
+            <a:endParaRPr lang="en-US" sz="3100" dirty="0"/>
           </a:p>
           <a:p>
             <a:pPr marL="457200" indent="-457200">
@@ -6901,7 +6939,7 @@
           <a:p>
             <a:r>
               <a:rPr lang="en-US" dirty="0"/>
-              <a:t>UWP Community Toolkit</a:t>
+              <a:t>WHAT WOULD YOU DO?</a:t>
             </a:r>
           </a:p>
         </p:txBody>
@@ -6920,8 +6958,8 @@
         </p:nvSpPr>
         <p:spPr>
           <a:xfrm>
-            <a:off x="839585" y="2044931"/>
-            <a:ext cx="10532226" cy="2000548"/>
+            <a:off x="829887" y="2077883"/>
+            <a:ext cx="10532226" cy="2477601"/>
           </a:xfrm>
           <a:prstGeom prst="rect">
             <a:avLst/>
@@ -6940,7 +6978,7 @@
             </a:pPr>
             <a:r>
               <a:rPr lang="en-US" sz="3100" dirty="0"/>
-              <a:t>Started with N-RECO</a:t>
+              <a:t>It’s not me, it’s YOU!</a:t>
             </a:r>
           </a:p>
           <a:p>
@@ -6950,7 +6988,7 @@
             </a:pPr>
             <a:r>
               <a:rPr lang="en-US" sz="3100" dirty="0"/>
-              <a:t>No, it started with GitHub</a:t>
+              <a:t>Are you like me?</a:t>
             </a:r>
           </a:p>
           <a:p>
@@ -6960,7 +6998,17 @@
             </a:pPr>
             <a:r>
               <a:rPr lang="en-US" sz="3100" dirty="0"/>
-              <a:t>NO!  It started with…</a:t>
+              <a:t>Report Bugs.  It’s a START!</a:t>
+            </a:r>
+          </a:p>
+          <a:p>
+            <a:pPr marL="457200" indent="-457200">
+              <a:buFont typeface="Arial" panose="020B0604020202020204" pitchFamily="34" charset="0"/>
+              <a:buChar char="•"/>
+            </a:pPr>
+            <a:r>
+              <a:rPr lang="en-US" sz="3100" dirty="0"/>
+              <a:t>It all starts with YOU!</a:t>
             </a:r>
           </a:p>
           <a:p>
@@ -7045,7 +7093,7 @@
     </p:spTree>
     <p:extLst>
       <p:ext uri="{BB962C8B-B14F-4D97-AF65-F5344CB8AC3E}">
-        <p14:creationId xmlns:p14="http://schemas.microsoft.com/office/powerpoint/2010/main" val="2097276829"/>
+        <p14:creationId xmlns:p14="http://schemas.microsoft.com/office/powerpoint/2010/main" val="2303047754"/>
       </p:ext>
     </p:extLst>
   </p:cSld>
@@ -7095,7 +7143,7 @@
           <a:p>
             <a:r>
               <a:rPr lang="en-US" dirty="0"/>
-              <a:t>FOLLOW THE PROCESS (or don’t)</a:t>
+              <a:t>UWP Community Toolkit</a:t>
             </a:r>
           </a:p>
         </p:txBody>
@@ -7115,7 +7163,7 @@
         <p:spPr>
           <a:xfrm>
             <a:off x="839585" y="2044931"/>
-            <a:ext cx="10532226" cy="1523494"/>
+            <a:ext cx="10532226" cy="2000548"/>
           </a:xfrm>
           <a:prstGeom prst="rect">
             <a:avLst/>
@@ -7134,7 +7182,7 @@
             </a:pPr>
             <a:r>
               <a:rPr lang="en-US" sz="3100" dirty="0"/>
-              <a:t>Forked and got to work.</a:t>
+              <a:t>Started with N-RECO</a:t>
             </a:r>
           </a:p>
           <a:p>
@@ -7144,7 +7192,17 @@
             </a:pPr>
             <a:r>
               <a:rPr lang="en-US" sz="3100" dirty="0"/>
-              <a:t>The Pull Request.</a:t>
+              <a:t>No, it started with GitHub</a:t>
+            </a:r>
+          </a:p>
+          <a:p>
+            <a:pPr marL="457200" indent="-457200">
+              <a:buFont typeface="Arial" panose="020B0604020202020204" pitchFamily="34" charset="0"/>
+              <a:buChar char="•"/>
+            </a:pPr>
+            <a:r>
+              <a:rPr lang="en-US" sz="3100" dirty="0"/>
+              <a:t>NO!  It started with…</a:t>
             </a:r>
           </a:p>
           <a:p>
@@ -7229,7 +7287,7 @@
     </p:spTree>
     <p:extLst>
       <p:ext uri="{BB962C8B-B14F-4D97-AF65-F5344CB8AC3E}">
-        <p14:creationId xmlns:p14="http://schemas.microsoft.com/office/powerpoint/2010/main" val="1653664407"/>
+        <p14:creationId xmlns:p14="http://schemas.microsoft.com/office/powerpoint/2010/main" val="2097276829"/>
       </p:ext>
     </p:extLst>
   </p:cSld>
@@ -7258,7 +7316,13 @@
       </p:grpSpPr>
       <p:sp>
         <p:nvSpPr>
-          <p:cNvPr id="2" name="Title 1"/>
+          <p:cNvPr id="2" name="Title 1">
+            <a:extLst>
+              <a:ext uri="{FF2B5EF4-FFF2-40B4-BE49-F238E27FC236}">
+                <a16:creationId xmlns:a16="http://schemas.microsoft.com/office/drawing/2014/main" id="{15897EB4-928B-499B-AE96-0FB6071C79F6}"/>
+              </a:ext>
+            </a:extLst>
+          </p:cNvPr>
           <p:cNvSpPr>
             <a:spLocks noGrp="1"/>
           </p:cNvSpPr>
@@ -7273,28 +7337,27 @@
           <a:p>
             <a:r>
               <a:rPr lang="en-US" dirty="0"/>
-              <a:t>? QUESTIONS ?</a:t>
-            </a:r>
-            <a:br>
-              <a:rPr lang="en-US" dirty="0"/>
-            </a:br>
-            <a:r>
-              <a:rPr lang="en-US" dirty="0"/>
-              <a:t>CONTACT – PARKER SMART</a:t>
-            </a:r>
-          </a:p>
-        </p:txBody>
-      </p:sp>
-      <p:sp>
-        <p:nvSpPr>
-          <p:cNvPr id="3" name="TextBox 2"/>
+              <a:t>FOLLOW THE PROCESS (or don’t)</a:t>
+            </a:r>
+          </a:p>
+        </p:txBody>
+      </p:sp>
+      <p:sp>
+        <p:nvSpPr>
+          <p:cNvPr id="4" name="TextBox 3">
+            <a:extLst>
+              <a:ext uri="{FF2B5EF4-FFF2-40B4-BE49-F238E27FC236}">
+                <a16:creationId xmlns:a16="http://schemas.microsoft.com/office/drawing/2014/main" id="{D8209725-78A1-4B7B-BB69-4318C7DB1317}"/>
+              </a:ext>
+            </a:extLst>
+          </p:cNvPr>
           <p:cNvSpPr txBox="1"/>
           <p:nvPr/>
         </p:nvSpPr>
         <p:spPr>
           <a:xfrm>
             <a:off x="839585" y="2044931"/>
-            <a:ext cx="10532226" cy="3539430"/>
+            <a:ext cx="10532226" cy="1523494"/>
           </a:xfrm>
           <a:prstGeom prst="rect">
             <a:avLst/>
@@ -7312,6 +7375,185 @@
               <a:buChar char="•"/>
             </a:pPr>
             <a:r>
+              <a:rPr lang="en-US" sz="3100" dirty="0"/>
+              <a:t>Forked and got to work.</a:t>
+            </a:r>
+          </a:p>
+          <a:p>
+            <a:pPr marL="457200" indent="-457200">
+              <a:buFont typeface="Arial" panose="020B0604020202020204" pitchFamily="34" charset="0"/>
+              <a:buChar char="•"/>
+            </a:pPr>
+            <a:r>
+              <a:rPr lang="en-US" sz="3100" dirty="0"/>
+              <a:t>The Pull Request.</a:t>
+            </a:r>
+          </a:p>
+          <a:p>
+            <a:pPr marL="457200" indent="-457200">
+              <a:buFont typeface="Arial" panose="020B0604020202020204" pitchFamily="34" charset="0"/>
+              <a:buChar char="•"/>
+            </a:pPr>
+            <a:endParaRPr lang="en-US" sz="3100" dirty="0"/>
+          </a:p>
+        </p:txBody>
+      </p:sp>
+      <p:sp>
+        <p:nvSpPr>
+          <p:cNvPr id="5" name="TextBox 4">
+            <a:extLst>
+              <a:ext uri="{FF2B5EF4-FFF2-40B4-BE49-F238E27FC236}">
+                <a16:creationId xmlns:a16="http://schemas.microsoft.com/office/drawing/2014/main" id="{5939B7F2-B094-4A61-A37A-BABADA1FF051}"/>
+              </a:ext>
+            </a:extLst>
+          </p:cNvPr>
+          <p:cNvSpPr txBox="1"/>
+          <p:nvPr/>
+        </p:nvSpPr>
+        <p:spPr>
+          <a:xfrm>
+            <a:off x="518985" y="6334898"/>
+            <a:ext cx="1933543" cy="369332"/>
+          </a:xfrm>
+          <a:prstGeom prst="rect">
+            <a:avLst/>
+          </a:prstGeom>
+          <a:noFill/>
+        </p:spPr>
+        <p:txBody>
+          <a:bodyPr wrap="none" rtlCol="0">
+            <a:spAutoFit/>
+          </a:bodyPr>
+          <a:lstStyle/>
+          <a:p>
+            <a:r>
+              <a:rPr lang="en-US" dirty="0"/>
+              <a:t>@</a:t>
+            </a:r>
+            <a:r>
+              <a:rPr lang="en-US" dirty="0" err="1"/>
+              <a:t>SpilledMilkCOM</a:t>
+            </a:r>
+            <a:endParaRPr lang="en-US" dirty="0"/>
+          </a:p>
+        </p:txBody>
+      </p:sp>
+      <p:pic>
+        <p:nvPicPr>
+          <p:cNvPr id="6" name="Picture 5">
+            <a:extLst>
+              <a:ext uri="{FF2B5EF4-FFF2-40B4-BE49-F238E27FC236}">
+                <a16:creationId xmlns:a16="http://schemas.microsoft.com/office/drawing/2014/main" id="{8C485CEF-569C-4E99-A23A-7BBB2DA3B4D3}"/>
+              </a:ext>
+            </a:extLst>
+          </p:cNvPr>
+          <p:cNvPicPr>
+            <a:picLocks noChangeAspect="1"/>
+          </p:cNvPicPr>
+          <p:nvPr/>
+        </p:nvPicPr>
+        <p:blipFill>
+          <a:blip r:embed="rId2"/>
+          <a:stretch>
+            <a:fillRect/>
+          </a:stretch>
+        </p:blipFill>
+        <p:spPr>
+          <a:xfrm>
+            <a:off x="81934" y="6318422"/>
+            <a:ext cx="437051" cy="301415"/>
+          </a:xfrm>
+          <a:prstGeom prst="rect">
+            <a:avLst/>
+          </a:prstGeom>
+        </p:spPr>
+      </p:pic>
+    </p:spTree>
+    <p:extLst>
+      <p:ext uri="{BB962C8B-B14F-4D97-AF65-F5344CB8AC3E}">
+        <p14:creationId xmlns:p14="http://schemas.microsoft.com/office/powerpoint/2010/main" val="1653664407"/>
+      </p:ext>
+    </p:extLst>
+  </p:cSld>
+  <p:clrMapOvr>
+    <a:masterClrMapping/>
+  </p:clrMapOvr>
+</p:sld>
+</file>
+
+<file path=ppt/slides/slide15.xml><?xml version="1.0" encoding="utf-8"?>
+<p:sld xmlns:a="http://schemas.openxmlformats.org/drawingml/2006/main" xmlns:r="http://schemas.openxmlformats.org/officeDocument/2006/relationships" xmlns:p="http://schemas.openxmlformats.org/presentationml/2006/main">
+  <p:cSld>
+    <p:spTree>
+      <p:nvGrpSpPr>
+        <p:cNvPr id="1" name=""/>
+        <p:cNvGrpSpPr/>
+        <p:nvPr/>
+      </p:nvGrpSpPr>
+      <p:grpSpPr>
+        <a:xfrm>
+          <a:off x="0" y="0"/>
+          <a:ext cx="0" cy="0"/>
+          <a:chOff x="0" y="0"/>
+          <a:chExt cx="0" cy="0"/>
+        </a:xfrm>
+      </p:grpSpPr>
+      <p:sp>
+        <p:nvSpPr>
+          <p:cNvPr id="2" name="Title 1"/>
+          <p:cNvSpPr>
+            <a:spLocks noGrp="1"/>
+          </p:cNvSpPr>
+          <p:nvPr>
+            <p:ph type="title"/>
+          </p:nvPr>
+        </p:nvSpPr>
+        <p:spPr/>
+        <p:txBody>
+          <a:bodyPr/>
+          <a:lstStyle/>
+          <a:p>
+            <a:r>
+              <a:rPr lang="en-US" dirty="0"/>
+              <a:t>? QUESTIONS ?</a:t>
+            </a:r>
+            <a:br>
+              <a:rPr lang="en-US" dirty="0"/>
+            </a:br>
+            <a:r>
+              <a:rPr lang="en-US" dirty="0"/>
+              <a:t>CONTACT – PARKER SMART</a:t>
+            </a:r>
+          </a:p>
+        </p:txBody>
+      </p:sp>
+      <p:sp>
+        <p:nvSpPr>
+          <p:cNvPr id="3" name="TextBox 2"/>
+          <p:cNvSpPr txBox="1"/>
+          <p:nvPr/>
+        </p:nvSpPr>
+        <p:spPr>
+          <a:xfrm>
+            <a:off x="839585" y="2044931"/>
+            <a:ext cx="10532226" cy="3539430"/>
+          </a:xfrm>
+          <a:prstGeom prst="rect">
+            <a:avLst/>
+          </a:prstGeom>
+          <a:noFill/>
+        </p:spPr>
+        <p:txBody>
+          <a:bodyPr wrap="square" rtlCol="0">
+            <a:spAutoFit/>
+          </a:bodyPr>
+          <a:lstStyle/>
+          <a:p>
+            <a:pPr marL="457200" indent="-457200">
+              <a:buFont typeface="Arial" panose="020B0604020202020204" pitchFamily="34" charset="0"/>
+              <a:buChar char="•"/>
+            </a:pPr>
+            <a:r>
               <a:rPr lang="en-US" sz="3200" dirty="0">
                 <a:hlinkClick r:id="rId2"/>
               </a:rPr>
@@ -7358,7 +7600,7 @@
             </a:pPr>
             <a:r>
               <a:rPr lang="en-US" sz="3200" dirty="0"/>
-              <a:t>Email</a:t>
+              <a:t>     Email</a:t>
             </a:r>
           </a:p>
           <a:p>
@@ -7368,7 +7610,7 @@
             </a:pPr>
             <a:r>
               <a:rPr lang="en-US" sz="3200" dirty="0"/>
-              <a:t>Twitter</a:t>
+              <a:t>     Twitter</a:t>
             </a:r>
           </a:p>
           <a:p>
@@ -7378,7 +7620,7 @@
             </a:pPr>
             <a:r>
               <a:rPr lang="en-US" sz="3200" dirty="0"/>
-              <a:t>Blog</a:t>
+              <a:t>     Blog</a:t>
             </a:r>
           </a:p>
           <a:p>
@@ -7388,7 +7630,7 @@
             </a:pPr>
             <a:r>
               <a:rPr lang="en-US" sz="3200" dirty="0"/>
-              <a:t>Xbox Live</a:t>
+              <a:t>     Xbox Live</a:t>
             </a:r>
           </a:p>
           <a:p>
@@ -7398,7 +7640,7 @@
             </a:pPr>
             <a:r>
               <a:rPr lang="en-US" sz="3200" dirty="0"/>
-              <a:t>GitHub</a:t>
+              <a:t>     GitHub</a:t>
             </a:r>
           </a:p>
         </p:txBody>
@@ -7419,8 +7661,188 @@
         </p:blipFill>
         <p:spPr>
           <a:xfrm>
-            <a:off x="7811713" y="3641108"/>
+            <a:off x="6427756" y="3641108"/>
             <a:ext cx="1340599" cy="1407630"/>
+          </a:xfrm>
+          <a:prstGeom prst="rect">
+            <a:avLst/>
+          </a:prstGeom>
+        </p:spPr>
+      </p:pic>
+      <p:pic>
+        <p:nvPicPr>
+          <p:cNvPr id="5" name="Picture 4">
+            <a:extLst>
+              <a:ext uri="{FF2B5EF4-FFF2-40B4-BE49-F238E27FC236}">
+                <a16:creationId xmlns:a16="http://schemas.microsoft.com/office/drawing/2014/main" id="{2699FB11-4626-4970-B64E-71E191ABCBAB}"/>
+              </a:ext>
+            </a:extLst>
+          </p:cNvPr>
+          <p:cNvPicPr>
+            <a:picLocks noChangeAspect="1"/>
+          </p:cNvPicPr>
+          <p:nvPr/>
+        </p:nvPicPr>
+        <p:blipFill>
+          <a:blip r:embed="rId6"/>
+          <a:stretch>
+            <a:fillRect/>
+          </a:stretch>
+        </p:blipFill>
+        <p:spPr>
+          <a:xfrm>
+            <a:off x="1877107" y="3641108"/>
+            <a:ext cx="437051" cy="301415"/>
+          </a:xfrm>
+          <a:prstGeom prst="rect">
+            <a:avLst/>
+          </a:prstGeom>
+        </p:spPr>
+      </p:pic>
+      <p:pic>
+        <p:nvPicPr>
+          <p:cNvPr id="9" name="Picture 8">
+            <a:extLst>
+              <a:ext uri="{FF2B5EF4-FFF2-40B4-BE49-F238E27FC236}">
+                <a16:creationId xmlns:a16="http://schemas.microsoft.com/office/drawing/2014/main" id="{8811F9D5-9B14-41A3-95F8-B737DDF751FA}"/>
+              </a:ext>
+            </a:extLst>
+          </p:cNvPr>
+          <p:cNvPicPr>
+            <a:picLocks noChangeAspect="1"/>
+          </p:cNvPicPr>
+          <p:nvPr/>
+        </p:nvPicPr>
+        <p:blipFill>
+          <a:blip r:embed="rId7"/>
+          <a:stretch>
+            <a:fillRect/>
+          </a:stretch>
+        </p:blipFill>
+        <p:spPr>
+          <a:xfrm>
+            <a:off x="1877106" y="5048738"/>
+            <a:ext cx="437051" cy="437051"/>
+          </a:xfrm>
+          <a:prstGeom prst="rect">
+            <a:avLst/>
+          </a:prstGeom>
+        </p:spPr>
+      </p:pic>
+      <p:pic>
+        <p:nvPicPr>
+          <p:cNvPr id="11" name="Picture 10">
+            <a:extLst>
+              <a:ext uri="{FF2B5EF4-FFF2-40B4-BE49-F238E27FC236}">
+                <a16:creationId xmlns:a16="http://schemas.microsoft.com/office/drawing/2014/main" id="{24DB1E1C-1E67-4C0B-A79F-76BD53770DBC}"/>
+              </a:ext>
+            </a:extLst>
+          </p:cNvPr>
+          <p:cNvPicPr>
+            <a:picLocks noChangeAspect="1"/>
+          </p:cNvPicPr>
+          <p:nvPr/>
+        </p:nvPicPr>
+        <p:blipFill>
+          <a:blip r:embed="rId8"/>
+          <a:stretch>
+            <a:fillRect/>
+          </a:stretch>
+        </p:blipFill>
+        <p:spPr>
+          <a:xfrm>
+            <a:off x="1877106" y="3128628"/>
+            <a:ext cx="513121" cy="512480"/>
+          </a:xfrm>
+          <a:prstGeom prst="rect">
+            <a:avLst/>
+          </a:prstGeom>
+        </p:spPr>
+      </p:pic>
+      <p:pic>
+        <p:nvPicPr>
+          <p:cNvPr id="13" name="Picture 12">
+            <a:extLst>
+              <a:ext uri="{FF2B5EF4-FFF2-40B4-BE49-F238E27FC236}">
+                <a16:creationId xmlns:a16="http://schemas.microsoft.com/office/drawing/2014/main" id="{BF7A95C9-BD6F-4B3F-88E6-DC1DBE39CDFF}"/>
+              </a:ext>
+            </a:extLst>
+          </p:cNvPr>
+          <p:cNvPicPr>
+            <a:picLocks noChangeAspect="1"/>
+          </p:cNvPicPr>
+          <p:nvPr/>
+        </p:nvPicPr>
+        <p:blipFill>
+          <a:blip r:embed="rId9"/>
+          <a:stretch>
+            <a:fillRect/>
+          </a:stretch>
+        </p:blipFill>
+        <p:spPr>
+          <a:xfrm>
+            <a:off x="1877106" y="4576817"/>
+            <a:ext cx="437051" cy="412285"/>
+          </a:xfrm>
+          <a:prstGeom prst="rect">
+            <a:avLst/>
+          </a:prstGeom>
+        </p:spPr>
+      </p:pic>
+      <p:pic>
+        <p:nvPicPr>
+          <p:cNvPr id="15" name="Picture 14">
+            <a:extLst>
+              <a:ext uri="{FF2B5EF4-FFF2-40B4-BE49-F238E27FC236}">
+                <a16:creationId xmlns:a16="http://schemas.microsoft.com/office/drawing/2014/main" id="{193F1BEE-0D73-4C4E-9B80-6BC924A34537}"/>
+              </a:ext>
+            </a:extLst>
+          </p:cNvPr>
+          <p:cNvPicPr>
+            <a:picLocks noChangeAspect="1"/>
+          </p:cNvPicPr>
+          <p:nvPr/>
+        </p:nvPicPr>
+        <p:blipFill>
+          <a:blip r:embed="rId10"/>
+          <a:stretch>
+            <a:fillRect/>
+          </a:stretch>
+        </p:blipFill>
+        <p:spPr>
+          <a:xfrm>
+            <a:off x="8435620" y="3641108"/>
+            <a:ext cx="2240618" cy="1680464"/>
+          </a:xfrm>
+          <a:prstGeom prst="rect">
+            <a:avLst/>
+          </a:prstGeom>
+        </p:spPr>
+      </p:pic>
+      <p:pic>
+        <p:nvPicPr>
+          <p:cNvPr id="17" name="Picture 16">
+            <a:extLst>
+              <a:ext uri="{FF2B5EF4-FFF2-40B4-BE49-F238E27FC236}">
+                <a16:creationId xmlns:a16="http://schemas.microsoft.com/office/drawing/2014/main" id="{B3EB9093-3654-490D-A0BD-9F47886B9C1A}"/>
+              </a:ext>
+            </a:extLst>
+          </p:cNvPr>
+          <p:cNvPicPr>
+            <a:picLocks noChangeAspect="1"/>
+          </p:cNvPicPr>
+          <p:nvPr/>
+        </p:nvPicPr>
+        <p:blipFill>
+          <a:blip r:embed="rId11"/>
+          <a:stretch>
+            <a:fillRect/>
+          </a:stretch>
+        </p:blipFill>
+        <p:spPr>
+          <a:xfrm>
+            <a:off x="1829444" y="4002159"/>
+            <a:ext cx="532373" cy="532373"/>
           </a:xfrm>
           <a:prstGeom prst="rect">
             <a:avLst/>
@@ -8539,13 +8961,8 @@
             </a:pPr>
             <a:r>
               <a:rPr lang="en-US" sz="3100" dirty="0"/>
-              <a:t>I like this exponential </a:t>
-            </a:r>
-            <a:r>
-              <a:rPr lang="en-US" sz="3100"/>
-              <a:t>progression better!</a:t>
-            </a:r>
-            <a:endParaRPr lang="en-US" sz="3100" dirty="0"/>
+              <a:t>I like this exponential progression better!</a:t>
+            </a:r>
           </a:p>
           <a:p>
             <a:pPr marL="457200" indent="-457200">
@@ -8699,7 +9116,7 @@
         <p:spPr>
           <a:xfrm>
             <a:off x="839585" y="2044931"/>
-            <a:ext cx="10532226" cy="3431709"/>
+            <a:ext cx="10532226" cy="3908762"/>
           </a:xfrm>
           <a:prstGeom prst="rect">
             <a:avLst/>
@@ -8769,6 +9186,16 @@
             <a:r>
               <a:rPr lang="en-US" sz="3100" dirty="0"/>
               <a:t>Free apps</a:t>
+            </a:r>
+          </a:p>
+          <a:p>
+            <a:pPr marL="457200" indent="-457200">
+              <a:buFont typeface="Arial" panose="020B0604020202020204" pitchFamily="34" charset="0"/>
+              <a:buChar char="•"/>
+            </a:pPr>
+            <a:r>
+              <a:rPr lang="en-US" sz="3100" dirty="0"/>
+              <a:t>“You’re ROYALTY! Why do you work?”</a:t>
             </a:r>
           </a:p>
           <a:p>

</xml_diff>

<commit_message>
Updated Power Point a bit...
</commit_message>
<xml_diff>
--- a/Giving Back.pptx
+++ b/Giving Back.pptx
@@ -12,14 +12,15 @@
     <p:sldId id="257" r:id="rId6"/>
     <p:sldId id="273" r:id="rId7"/>
     <p:sldId id="270" r:id="rId8"/>
-    <p:sldId id="279" r:id="rId9"/>
-    <p:sldId id="278" r:id="rId10"/>
-    <p:sldId id="271" r:id="rId11"/>
-    <p:sldId id="272" r:id="rId12"/>
-    <p:sldId id="280" r:id="rId13"/>
-    <p:sldId id="276" r:id="rId14"/>
-    <p:sldId id="277" r:id="rId15"/>
-    <p:sldId id="258" r:id="rId16"/>
+    <p:sldId id="283" r:id="rId9"/>
+    <p:sldId id="279" r:id="rId10"/>
+    <p:sldId id="282" r:id="rId11"/>
+    <p:sldId id="278" r:id="rId12"/>
+    <p:sldId id="271" r:id="rId13"/>
+    <p:sldId id="272" r:id="rId14"/>
+    <p:sldId id="280" r:id="rId15"/>
+    <p:sldId id="281" r:id="rId16"/>
+    <p:sldId id="258" r:id="rId17"/>
   </p:sldIdLst>
   <p:sldSz cx="12192000" cy="6858000"/>
   <p:notesSz cx="6858000" cy="9144000"/>
@@ -301,7 +302,7 @@
           <a:p>
             <a:fld id="{48A87A34-81AB-432B-8DAE-1953F412C126}" type="datetimeFigureOut">
               <a:rPr lang="en-US" dirty="0"/>
-              <a:t>6/10/2017</a:t>
+              <a:t>6/19/2017</a:t>
             </a:fld>
             <a:endParaRPr lang="en-US" dirty="0"/>
           </a:p>
@@ -611,7 +612,7 @@
           <a:p>
             <a:fld id="{48A87A34-81AB-432B-8DAE-1953F412C126}" type="datetimeFigureOut">
               <a:rPr lang="en-US" dirty="0"/>
-              <a:t>6/10/2017</a:t>
+              <a:t>6/19/2017</a:t>
             </a:fld>
             <a:endParaRPr lang="en-US" dirty="0"/>
           </a:p>
@@ -828,7 +829,7 @@
           <a:p>
             <a:fld id="{48A87A34-81AB-432B-8DAE-1953F412C126}" type="datetimeFigureOut">
               <a:rPr lang="en-US" dirty="0"/>
-              <a:t>6/10/2017</a:t>
+              <a:t>6/19/2017</a:t>
             </a:fld>
             <a:endParaRPr lang="en-US" dirty="0"/>
           </a:p>
@@ -1114,7 +1115,7 @@
           <a:p>
             <a:fld id="{48A87A34-81AB-432B-8DAE-1953F412C126}" type="datetimeFigureOut">
               <a:rPr lang="en-US" dirty="0"/>
-              <a:t>6/10/2017</a:t>
+              <a:t>6/19/2017</a:t>
             </a:fld>
             <a:endParaRPr lang="en-US" dirty="0"/>
           </a:p>
@@ -1563,7 +1564,7 @@
           <a:p>
             <a:fld id="{48A87A34-81AB-432B-8DAE-1953F412C126}" type="datetimeFigureOut">
               <a:rPr lang="en-US" dirty="0"/>
-              <a:t>6/10/2017</a:t>
+              <a:t>6/19/2017</a:t>
             </a:fld>
             <a:endParaRPr lang="en-US" dirty="0"/>
           </a:p>
@@ -2134,7 +2135,7 @@
           <a:p>
             <a:fld id="{48A87A34-81AB-432B-8DAE-1953F412C126}" type="datetimeFigureOut">
               <a:rPr lang="en-US" dirty="0"/>
-              <a:t>6/10/2017</a:t>
+              <a:t>6/19/2017</a:t>
             </a:fld>
             <a:endParaRPr lang="en-US" dirty="0"/>
           </a:p>
@@ -2990,7 +2991,7 @@
           <a:p>
             <a:fld id="{48A87A34-81AB-432B-8DAE-1953F412C126}" type="datetimeFigureOut">
               <a:rPr lang="en-US" dirty="0"/>
-              <a:t>6/10/2017</a:t>
+              <a:t>6/19/2017</a:t>
             </a:fld>
             <a:endParaRPr lang="en-US" dirty="0"/>
           </a:p>
@@ -3190,7 +3191,7 @@
           <a:p>
             <a:fld id="{48A87A34-81AB-432B-8DAE-1953F412C126}" type="datetimeFigureOut">
               <a:rPr lang="en-US" dirty="0"/>
-              <a:t>6/10/2017</a:t>
+              <a:t>6/19/2017</a:t>
             </a:fld>
             <a:endParaRPr lang="en-US" dirty="0"/>
           </a:p>
@@ -3399,7 +3400,7 @@
           <a:p>
             <a:fld id="{48A87A34-81AB-432B-8DAE-1953F412C126}" type="datetimeFigureOut">
               <a:rPr lang="en-US" dirty="0"/>
-              <a:t>6/10/2017</a:t>
+              <a:t>6/19/2017</a:t>
             </a:fld>
             <a:endParaRPr lang="en-US" dirty="0"/>
           </a:p>
@@ -3599,7 +3600,7 @@
           <a:p>
             <a:fld id="{48A87A34-81AB-432B-8DAE-1953F412C126}" type="datetimeFigureOut">
               <a:rPr lang="en-US" dirty="0"/>
-              <a:t>6/10/2017</a:t>
+              <a:t>6/19/2017</a:t>
             </a:fld>
             <a:endParaRPr lang="en-US" dirty="0"/>
           </a:p>
@@ -3874,7 +3875,7 @@
           <a:p>
             <a:fld id="{48A87A34-81AB-432B-8DAE-1953F412C126}" type="datetimeFigureOut">
               <a:rPr lang="en-US" dirty="0"/>
-              <a:t>6/10/2017</a:t>
+              <a:t>6/19/2017</a:t>
             </a:fld>
             <a:endParaRPr lang="en-US" dirty="0"/>
           </a:p>
@@ -4136,7 +4137,7 @@
           <a:p>
             <a:fld id="{48A87A34-81AB-432B-8DAE-1953F412C126}" type="datetimeFigureOut">
               <a:rPr lang="en-US" dirty="0"/>
-              <a:t>6/10/2017</a:t>
+              <a:t>6/19/2017</a:t>
             </a:fld>
             <a:endParaRPr lang="en-US" dirty="0"/>
           </a:p>
@@ -4546,7 +4547,7 @@
           <a:p>
             <a:fld id="{48A87A34-81AB-432B-8DAE-1953F412C126}" type="datetimeFigureOut">
               <a:rPr lang="en-US" dirty="0"/>
-              <a:t>6/10/2017</a:t>
+              <a:t>6/19/2017</a:t>
             </a:fld>
             <a:endParaRPr lang="en-US" dirty="0"/>
           </a:p>
@@ -4689,7 +4690,7 @@
           <a:p>
             <a:fld id="{48A87A34-81AB-432B-8DAE-1953F412C126}" type="datetimeFigureOut">
               <a:rPr lang="en-US" dirty="0"/>
-              <a:t>6/10/2017</a:t>
+              <a:t>6/19/2017</a:t>
             </a:fld>
             <a:endParaRPr lang="en-US" dirty="0"/>
           </a:p>
@@ -4809,7 +4810,7 @@
           <a:p>
             <a:fld id="{48A87A34-81AB-432B-8DAE-1953F412C126}" type="datetimeFigureOut">
               <a:rPr lang="en-US" dirty="0"/>
-              <a:t>6/10/2017</a:t>
+              <a:t>6/19/2017</a:t>
             </a:fld>
             <a:endParaRPr lang="en-US" dirty="0"/>
           </a:p>
@@ -5083,7 +5084,7 @@
           <a:p>
             <a:fld id="{48A87A34-81AB-432B-8DAE-1953F412C126}" type="datetimeFigureOut">
               <a:rPr lang="en-US" dirty="0"/>
-              <a:t>6/10/2017</a:t>
+              <a:t>6/19/2017</a:t>
             </a:fld>
             <a:endParaRPr lang="en-US" dirty="0"/>
           </a:p>
@@ -5393,7 +5394,7 @@
           <a:p>
             <a:fld id="{48A87A34-81AB-432B-8DAE-1953F412C126}" type="datetimeFigureOut">
               <a:rPr lang="en-US" dirty="0"/>
-              <a:t>6/10/2017</a:t>
+              <a:t>6/19/2017</a:t>
             </a:fld>
             <a:endParaRPr lang="en-US" dirty="0"/>
           </a:p>
@@ -5642,7 +5643,7 @@
             <a:fld id="{48A87A34-81AB-432B-8DAE-1953F412C126}" type="datetimeFigureOut">
               <a:rPr lang="en-US" dirty="0"/>
               <a:pPr/>
-              <a:t>6/10/2017</a:t>
+              <a:t>6/19/2017</a:t>
             </a:fld>
             <a:endParaRPr lang="en-US" dirty="0"/>
           </a:p>
@@ -6524,7 +6525,7 @@
           <a:p>
             <a:r>
               <a:rPr lang="en-US" dirty="0"/>
-              <a:t>WWJD?</a:t>
+              <a:t>UWP Community Toolkit</a:t>
             </a:r>
           </a:p>
         </p:txBody>
@@ -6563,7 +6564,7 @@
             </a:pPr>
             <a:r>
               <a:rPr lang="en-US" sz="3100" dirty="0"/>
-              <a:t>What would JERRY do?</a:t>
+              <a:t>Started with N-RECO</a:t>
             </a:r>
           </a:p>
           <a:p>
@@ -6573,7 +6574,7 @@
             </a:pPr>
             <a:r>
               <a:rPr lang="en-US" sz="3100" dirty="0"/>
-              <a:t>Does he get paid to do this?</a:t>
+              <a:t>No, it started with GitHub</a:t>
             </a:r>
           </a:p>
           <a:p>
@@ -6583,7 +6584,7 @@
             </a:pPr>
             <a:r>
               <a:rPr lang="en-US" sz="3100" dirty="0"/>
-              <a:t>Very inspirational</a:t>
+              <a:t>NO!  It started with…</a:t>
             </a:r>
           </a:p>
           <a:p>
@@ -6600,7 +6601,7 @@
           <p:cNvPr id="5" name="TextBox 4">
             <a:extLst>
               <a:ext uri="{FF2B5EF4-FFF2-40B4-BE49-F238E27FC236}">
-                <a16:creationId xmlns:a16="http://schemas.microsoft.com/office/drawing/2014/main" id="{3E361B44-F2F6-419E-AC00-4909D33D7715}"/>
+                <a16:creationId xmlns:a16="http://schemas.microsoft.com/office/drawing/2014/main" id="{5939B7F2-B094-4A61-A37A-BABADA1FF051}"/>
               </a:ext>
             </a:extLst>
           </p:cNvPr>
@@ -6640,7 +6641,7 @@
           <p:cNvPr id="6" name="Picture 5">
             <a:extLst>
               <a:ext uri="{FF2B5EF4-FFF2-40B4-BE49-F238E27FC236}">
-                <a16:creationId xmlns:a16="http://schemas.microsoft.com/office/drawing/2014/main" id="{3D15122E-478E-4AD4-ACAF-8C5DD4DEB7F2}"/>
+                <a16:creationId xmlns:a16="http://schemas.microsoft.com/office/drawing/2014/main" id="{8C485CEF-569C-4E99-A23A-7BBB2DA3B4D3}"/>
               </a:ext>
             </a:extLst>
           </p:cNvPr>
@@ -6668,7 +6669,7 @@
     </p:spTree>
     <p:extLst>
       <p:ext uri="{BB962C8B-B14F-4D97-AF65-F5344CB8AC3E}">
-        <p14:creationId xmlns:p14="http://schemas.microsoft.com/office/powerpoint/2010/main" val="4150981980"/>
+        <p14:creationId xmlns:p14="http://schemas.microsoft.com/office/powerpoint/2010/main" val="3714889405"/>
       </p:ext>
     </p:extLst>
   </p:cSld>
@@ -6718,7 +6719,7 @@
           <a:p>
             <a:r>
               <a:rPr lang="en-US" dirty="0"/>
-              <a:t>WAYS TO GIVE BACK</a:t>
+              <a:t>A little history lesson</a:t>
             </a:r>
           </a:p>
         </p:txBody>
@@ -6737,8 +6738,8 @@
         </p:nvSpPr>
         <p:spPr>
           <a:xfrm>
-            <a:off x="829887" y="2077883"/>
-            <a:ext cx="10532226" cy="3431709"/>
+            <a:off x="839585" y="2044931"/>
+            <a:ext cx="10532226" cy="3908762"/>
           </a:xfrm>
           <a:prstGeom prst="rect">
             <a:avLst/>
@@ -6757,7 +6758,7 @@
             </a:pPr>
             <a:r>
               <a:rPr lang="en-US" sz="3100" dirty="0"/>
-              <a:t>Report bugs</a:t>
+              <a:t>1983 Gallagher Power Fence Inventory</a:t>
             </a:r>
           </a:p>
           <a:p>
@@ -6767,8 +6768,13 @@
             </a:pPr>
             <a:r>
               <a:rPr lang="en-US" sz="3100" dirty="0"/>
-              <a:t>Feedback</a:t>
-            </a:r>
+              <a:t>1991 </a:t>
+            </a:r>
+            <a:r>
+              <a:rPr lang="en-US" sz="3100" dirty="0" err="1"/>
+              <a:t>XmMotif</a:t>
+            </a:r>
+            <a:endParaRPr lang="en-US" sz="3100" dirty="0"/>
           </a:p>
           <a:p>
             <a:pPr marL="457200" indent="-457200">
@@ -6777,7 +6783,15 @@
             </a:pPr>
             <a:r>
               <a:rPr lang="en-US" sz="3100" dirty="0"/>
-              <a:t>Mentor</a:t>
+              <a:t>1992 Space War (</a:t>
+            </a:r>
+            <a:r>
+              <a:rPr lang="en-US" sz="3100" dirty="0" err="1"/>
+              <a:t>Xwindows</a:t>
+            </a:r>
+            <a:r>
+              <a:rPr lang="en-US" sz="3100" dirty="0"/>
+              <a:t>)</a:t>
             </a:r>
           </a:p>
           <a:p>
@@ -6787,7 +6801,7 @@
             </a:pPr>
             <a:r>
               <a:rPr lang="en-US" sz="3100" dirty="0"/>
-              <a:t>Talks</a:t>
+              <a:t>1997 The Master-List</a:t>
             </a:r>
           </a:p>
           <a:p>
@@ -6797,7 +6811,27 @@
             </a:pPr>
             <a:r>
               <a:rPr lang="en-US" sz="3100" dirty="0"/>
-              <a:t>Free Stuff</a:t>
+              <a:t>1998 eBay (what should I sell?)</a:t>
+            </a:r>
+          </a:p>
+          <a:p>
+            <a:pPr marL="457200" indent="-457200">
+              <a:buFont typeface="Arial" panose="020B0604020202020204" pitchFamily="34" charset="0"/>
+              <a:buChar char="•"/>
+            </a:pPr>
+            <a:r>
+              <a:rPr lang="en-US" sz="3100" dirty="0"/>
+              <a:t>2013 Twitter sticky tweet</a:t>
+            </a:r>
+          </a:p>
+          <a:p>
+            <a:pPr marL="457200" indent="-457200">
+              <a:buFont typeface="Arial" panose="020B0604020202020204" pitchFamily="34" charset="0"/>
+              <a:buChar char="•"/>
+            </a:pPr>
+            <a:r>
+              <a:rPr lang="en-US" sz="3100" dirty="0"/>
+              <a:t>Constantly thinking…  Brain NEVER shuts off!</a:t>
             </a:r>
           </a:p>
           <a:p>
@@ -6807,13 +6841,6 @@
             </a:pPr>
             <a:endParaRPr lang="en-US" sz="3100" dirty="0"/>
           </a:p>
-          <a:p>
-            <a:pPr marL="457200" indent="-457200">
-              <a:buFont typeface="Arial" panose="020B0604020202020204" pitchFamily="34" charset="0"/>
-              <a:buChar char="•"/>
-            </a:pPr>
-            <a:endParaRPr lang="en-US" sz="3100" dirty="0"/>
-          </a:p>
         </p:txBody>
       </p:sp>
       <p:sp>
@@ -6821,7 +6848,7 @@
           <p:cNvPr id="5" name="TextBox 4">
             <a:extLst>
               <a:ext uri="{FF2B5EF4-FFF2-40B4-BE49-F238E27FC236}">
-                <a16:creationId xmlns:a16="http://schemas.microsoft.com/office/drawing/2014/main" id="{5939B7F2-B094-4A61-A37A-BABADA1FF051}"/>
+                <a16:creationId xmlns:a16="http://schemas.microsoft.com/office/drawing/2014/main" id="{2954402D-6002-4F53-8EC3-75DFBC567BEA}"/>
               </a:ext>
             </a:extLst>
           </p:cNvPr>
@@ -6861,7 +6888,7 @@
           <p:cNvPr id="6" name="Picture 5">
             <a:extLst>
               <a:ext uri="{FF2B5EF4-FFF2-40B4-BE49-F238E27FC236}">
-                <a16:creationId xmlns:a16="http://schemas.microsoft.com/office/drawing/2014/main" id="{8C485CEF-569C-4E99-A23A-7BBB2DA3B4D3}"/>
+                <a16:creationId xmlns:a16="http://schemas.microsoft.com/office/drawing/2014/main" id="{6EBF7E5F-9A19-4483-AAC4-F4319A60014B}"/>
               </a:ext>
             </a:extLst>
           </p:cNvPr>
@@ -6889,7 +6916,7 @@
     </p:spTree>
     <p:extLst>
       <p:ext uri="{BB962C8B-B14F-4D97-AF65-F5344CB8AC3E}">
-        <p14:creationId xmlns:p14="http://schemas.microsoft.com/office/powerpoint/2010/main" val="1014307122"/>
+        <p14:creationId xmlns:p14="http://schemas.microsoft.com/office/powerpoint/2010/main" val="620286551"/>
       </p:ext>
     </p:extLst>
   </p:cSld>
@@ -6939,7 +6966,7 @@
           <a:p>
             <a:r>
               <a:rPr lang="en-US" dirty="0"/>
-              <a:t>WHAT WOULD YOU DO?</a:t>
+              <a:t>WWJD?</a:t>
             </a:r>
           </a:p>
         </p:txBody>
@@ -6958,8 +6985,8 @@
         </p:nvSpPr>
         <p:spPr>
           <a:xfrm>
-            <a:off x="829887" y="2077883"/>
-            <a:ext cx="10532226" cy="2477601"/>
+            <a:off x="839585" y="2044931"/>
+            <a:ext cx="10532226" cy="2000548"/>
           </a:xfrm>
           <a:prstGeom prst="rect">
             <a:avLst/>
@@ -6978,7 +7005,7 @@
             </a:pPr>
             <a:r>
               <a:rPr lang="en-US" sz="3100" dirty="0"/>
-              <a:t>It’s not me, it’s YOU!</a:t>
+              <a:t>What would JERRY do?</a:t>
             </a:r>
           </a:p>
           <a:p>
@@ -6988,7 +7015,7 @@
             </a:pPr>
             <a:r>
               <a:rPr lang="en-US" sz="3100" dirty="0"/>
-              <a:t>Are you like me?</a:t>
+              <a:t>Does he get paid to do this?</a:t>
             </a:r>
           </a:p>
           <a:p>
@@ -6998,17 +7025,7 @@
             </a:pPr>
             <a:r>
               <a:rPr lang="en-US" sz="3100" dirty="0"/>
-              <a:t>Report Bugs.  It’s a START!</a:t>
-            </a:r>
-          </a:p>
-          <a:p>
-            <a:pPr marL="457200" indent="-457200">
-              <a:buFont typeface="Arial" panose="020B0604020202020204" pitchFamily="34" charset="0"/>
-              <a:buChar char="•"/>
-            </a:pPr>
-            <a:r>
-              <a:rPr lang="en-US" sz="3100" dirty="0"/>
-              <a:t>It all starts with YOU!</a:t>
+              <a:t>Very inspirational</a:t>
             </a:r>
           </a:p>
           <a:p>
@@ -7025,7 +7042,7 @@
           <p:cNvPr id="5" name="TextBox 4">
             <a:extLst>
               <a:ext uri="{FF2B5EF4-FFF2-40B4-BE49-F238E27FC236}">
-                <a16:creationId xmlns:a16="http://schemas.microsoft.com/office/drawing/2014/main" id="{5939B7F2-B094-4A61-A37A-BABADA1FF051}"/>
+                <a16:creationId xmlns:a16="http://schemas.microsoft.com/office/drawing/2014/main" id="{3E361B44-F2F6-419E-AC00-4909D33D7715}"/>
               </a:ext>
             </a:extLst>
           </p:cNvPr>
@@ -7065,7 +7082,7 @@
           <p:cNvPr id="6" name="Picture 5">
             <a:extLst>
               <a:ext uri="{FF2B5EF4-FFF2-40B4-BE49-F238E27FC236}">
-                <a16:creationId xmlns:a16="http://schemas.microsoft.com/office/drawing/2014/main" id="{8C485CEF-569C-4E99-A23A-7BBB2DA3B4D3}"/>
+                <a16:creationId xmlns:a16="http://schemas.microsoft.com/office/drawing/2014/main" id="{3D15122E-478E-4AD4-ACAF-8C5DD4DEB7F2}"/>
               </a:ext>
             </a:extLst>
           </p:cNvPr>
@@ -7093,7 +7110,7 @@
     </p:spTree>
     <p:extLst>
       <p:ext uri="{BB962C8B-B14F-4D97-AF65-F5344CB8AC3E}">
-        <p14:creationId xmlns:p14="http://schemas.microsoft.com/office/powerpoint/2010/main" val="2303047754"/>
+        <p14:creationId xmlns:p14="http://schemas.microsoft.com/office/powerpoint/2010/main" val="4150981980"/>
       </p:ext>
     </p:extLst>
   </p:cSld>
@@ -7143,7 +7160,7 @@
           <a:p>
             <a:r>
               <a:rPr lang="en-US" dirty="0"/>
-              <a:t>UWP Community Toolkit</a:t>
+              <a:t>WAYS TO GIVE BACK</a:t>
             </a:r>
           </a:p>
         </p:txBody>
@@ -7162,8 +7179,8 @@
         </p:nvSpPr>
         <p:spPr>
           <a:xfrm>
-            <a:off x="839585" y="2044931"/>
-            <a:ext cx="10532226" cy="2000548"/>
+            <a:off x="829887" y="2077883"/>
+            <a:ext cx="10532226" cy="3431709"/>
           </a:xfrm>
           <a:prstGeom prst="rect">
             <a:avLst/>
@@ -7182,7 +7199,7 @@
             </a:pPr>
             <a:r>
               <a:rPr lang="en-US" sz="3100" dirty="0"/>
-              <a:t>Started with N-RECO</a:t>
+              <a:t>Report bugs</a:t>
             </a:r>
           </a:p>
           <a:p>
@@ -7192,7 +7209,7 @@
             </a:pPr>
             <a:r>
               <a:rPr lang="en-US" sz="3100" dirty="0"/>
-              <a:t>No, it started with GitHub</a:t>
+              <a:t>Feedback</a:t>
             </a:r>
           </a:p>
           <a:p>
@@ -7202,8 +7219,35 @@
             </a:pPr>
             <a:r>
               <a:rPr lang="en-US" sz="3100" dirty="0"/>
-              <a:t>NO!  It started with…</a:t>
-            </a:r>
+              <a:t>Mentor (at work or school)</a:t>
+            </a:r>
+          </a:p>
+          <a:p>
+            <a:pPr marL="457200" indent="-457200">
+              <a:buFont typeface="Arial" panose="020B0604020202020204" pitchFamily="34" charset="0"/>
+              <a:buChar char="•"/>
+            </a:pPr>
+            <a:r>
+              <a:rPr lang="en-US" sz="3100" dirty="0"/>
+              <a:t>Talks (like this one)</a:t>
+            </a:r>
+          </a:p>
+          <a:p>
+            <a:pPr marL="457200" indent="-457200">
+              <a:buFont typeface="Arial" panose="020B0604020202020204" pitchFamily="34" charset="0"/>
+              <a:buChar char="•"/>
+            </a:pPr>
+            <a:r>
+              <a:rPr lang="en-US" sz="3100" dirty="0"/>
+              <a:t>Free Stuff</a:t>
+            </a:r>
+          </a:p>
+          <a:p>
+            <a:pPr marL="457200" indent="-457200">
+              <a:buFont typeface="Arial" panose="020B0604020202020204" pitchFamily="34" charset="0"/>
+              <a:buChar char="•"/>
+            </a:pPr>
+            <a:endParaRPr lang="en-US" sz="3100" dirty="0"/>
           </a:p>
           <a:p>
             <a:pPr marL="457200" indent="-457200">
@@ -7287,7 +7331,7 @@
     </p:spTree>
     <p:extLst>
       <p:ext uri="{BB962C8B-B14F-4D97-AF65-F5344CB8AC3E}">
-        <p14:creationId xmlns:p14="http://schemas.microsoft.com/office/powerpoint/2010/main" val="2097276829"/>
+        <p14:creationId xmlns:p14="http://schemas.microsoft.com/office/powerpoint/2010/main" val="1014307122"/>
       </p:ext>
     </p:extLst>
   </p:cSld>
@@ -7337,7 +7381,7 @@
           <a:p>
             <a:r>
               <a:rPr lang="en-US" dirty="0"/>
-              <a:t>FOLLOW THE PROCESS (or don’t)</a:t>
+              <a:t>WHAT WOULD YOU DO?</a:t>
             </a:r>
           </a:p>
         </p:txBody>
@@ -7356,8 +7400,8 @@
         </p:nvSpPr>
         <p:spPr>
           <a:xfrm>
-            <a:off x="839585" y="2044931"/>
-            <a:ext cx="10532226" cy="1523494"/>
+            <a:off x="829887" y="2077883"/>
+            <a:ext cx="10532226" cy="2477601"/>
           </a:xfrm>
           <a:prstGeom prst="rect">
             <a:avLst/>
@@ -7376,7 +7420,7 @@
             </a:pPr>
             <a:r>
               <a:rPr lang="en-US" sz="3100" dirty="0"/>
-              <a:t>Forked and got to work.</a:t>
+              <a:t>It’s not me, it’s YOU!</a:t>
             </a:r>
           </a:p>
           <a:p>
@@ -7386,7 +7430,27 @@
             </a:pPr>
             <a:r>
               <a:rPr lang="en-US" sz="3100" dirty="0"/>
-              <a:t>The Pull Request.</a:t>
+              <a:t>Are you like me?</a:t>
+            </a:r>
+          </a:p>
+          <a:p>
+            <a:pPr marL="457200" indent="-457200">
+              <a:buFont typeface="Arial" panose="020B0604020202020204" pitchFamily="34" charset="0"/>
+              <a:buChar char="•"/>
+            </a:pPr>
+            <a:r>
+              <a:rPr lang="en-US" sz="3100" dirty="0"/>
+              <a:t>Report Bugs.  It’s a START!</a:t>
+            </a:r>
+          </a:p>
+          <a:p>
+            <a:pPr marL="457200" indent="-457200">
+              <a:buFont typeface="Arial" panose="020B0604020202020204" pitchFamily="34" charset="0"/>
+              <a:buChar char="•"/>
+            </a:pPr>
+            <a:r>
+              <a:rPr lang="en-US" sz="3100" dirty="0"/>
+              <a:t>It all starts with YOU!</a:t>
             </a:r>
           </a:p>
           <a:p>
@@ -7471,7 +7535,7 @@
     </p:spTree>
     <p:extLst>
       <p:ext uri="{BB962C8B-B14F-4D97-AF65-F5344CB8AC3E}">
-        <p14:creationId xmlns:p14="http://schemas.microsoft.com/office/powerpoint/2010/main" val="1653664407"/>
+        <p14:creationId xmlns:p14="http://schemas.microsoft.com/office/powerpoint/2010/main" val="2303047754"/>
       </p:ext>
     </p:extLst>
   </p:cSld>
@@ -7482,6 +7546,240 @@
 </file>
 
 <file path=ppt/slides/slide15.xml><?xml version="1.0" encoding="utf-8"?>
+<p:sld xmlns:a="http://schemas.openxmlformats.org/drawingml/2006/main" xmlns:r="http://schemas.openxmlformats.org/officeDocument/2006/relationships" xmlns:p="http://schemas.openxmlformats.org/presentationml/2006/main">
+  <p:cSld>
+    <p:spTree>
+      <p:nvGrpSpPr>
+        <p:cNvPr id="1" name=""/>
+        <p:cNvGrpSpPr/>
+        <p:nvPr/>
+      </p:nvGrpSpPr>
+      <p:grpSpPr>
+        <a:xfrm>
+          <a:off x="0" y="0"/>
+          <a:ext cx="0" cy="0"/>
+          <a:chOff x="0" y="0"/>
+          <a:chExt cx="0" cy="0"/>
+        </a:xfrm>
+      </p:grpSpPr>
+      <p:sp>
+        <p:nvSpPr>
+          <p:cNvPr id="2" name="Title 1">
+            <a:extLst>
+              <a:ext uri="{FF2B5EF4-FFF2-40B4-BE49-F238E27FC236}">
+                <a16:creationId xmlns:a16="http://schemas.microsoft.com/office/drawing/2014/main" id="{15897EB4-928B-499B-AE96-0FB6071C79F6}"/>
+              </a:ext>
+            </a:extLst>
+          </p:cNvPr>
+          <p:cNvSpPr>
+            <a:spLocks noGrp="1"/>
+          </p:cNvSpPr>
+          <p:nvPr>
+            <p:ph type="title"/>
+          </p:nvPr>
+        </p:nvSpPr>
+        <p:spPr/>
+        <p:txBody>
+          <a:bodyPr/>
+          <a:lstStyle/>
+          <a:p>
+            <a:r>
+              <a:rPr lang="en-US" dirty="0"/>
+              <a:t>FOLLOW THE PROCESS (or don’t)</a:t>
+            </a:r>
+          </a:p>
+        </p:txBody>
+      </p:sp>
+      <p:sp>
+        <p:nvSpPr>
+          <p:cNvPr id="4" name="TextBox 3">
+            <a:extLst>
+              <a:ext uri="{FF2B5EF4-FFF2-40B4-BE49-F238E27FC236}">
+                <a16:creationId xmlns:a16="http://schemas.microsoft.com/office/drawing/2014/main" id="{D8209725-78A1-4B7B-BB69-4318C7DB1317}"/>
+              </a:ext>
+            </a:extLst>
+          </p:cNvPr>
+          <p:cNvSpPr txBox="1"/>
+          <p:nvPr/>
+        </p:nvSpPr>
+        <p:spPr>
+          <a:xfrm>
+            <a:off x="839585" y="2044931"/>
+            <a:ext cx="10532226" cy="3770263"/>
+          </a:xfrm>
+          <a:prstGeom prst="rect">
+            <a:avLst/>
+          </a:prstGeom>
+          <a:noFill/>
+        </p:spPr>
+        <p:txBody>
+          <a:bodyPr wrap="square" rtlCol="0">
+            <a:spAutoFit/>
+          </a:bodyPr>
+          <a:lstStyle/>
+          <a:p>
+            <a:pPr marL="457200" indent="-457200">
+              <a:buFont typeface="Arial" panose="020B0604020202020204" pitchFamily="34" charset="0"/>
+              <a:buChar char="•"/>
+            </a:pPr>
+            <a:r>
+              <a:rPr lang="en-US" sz="3100" dirty="0"/>
+              <a:t>Forked and got to work</a:t>
+            </a:r>
+          </a:p>
+          <a:p>
+            <a:pPr marL="457200" indent="-457200">
+              <a:buFont typeface="Arial" panose="020B0604020202020204" pitchFamily="34" charset="0"/>
+              <a:buChar char="•"/>
+            </a:pPr>
+            <a:r>
+              <a:rPr lang="en-US" sz="3100" dirty="0"/>
+              <a:t>The Pull Request</a:t>
+            </a:r>
+          </a:p>
+          <a:p>
+            <a:pPr marL="457200" indent="-457200">
+              <a:buFont typeface="Arial" panose="020B0604020202020204" pitchFamily="34" charset="0"/>
+              <a:buChar char="•"/>
+            </a:pPr>
+            <a:r>
+              <a:rPr lang="en-US" sz="2800" dirty="0">
+                <a:hlinkClick r:id="rId2"/>
+              </a:rPr>
+              <a:t>https://github.com/Microsoft/UWPCommunityToolkit/pull/714</a:t>
+            </a:r>
+            <a:endParaRPr lang="en-US" sz="2800" dirty="0"/>
+          </a:p>
+          <a:p>
+            <a:pPr marL="457200" indent="-457200">
+              <a:buFont typeface="Arial" panose="020B0604020202020204" pitchFamily="34" charset="0"/>
+              <a:buChar char="•"/>
+            </a:pPr>
+            <a:r>
+              <a:rPr lang="en-US" sz="3100" dirty="0"/>
+              <a:t>More Updates</a:t>
+            </a:r>
+          </a:p>
+          <a:p>
+            <a:pPr marL="457200" indent="-457200">
+              <a:buFont typeface="Arial" panose="020B0604020202020204" pitchFamily="34" charset="0"/>
+              <a:buChar char="•"/>
+            </a:pPr>
+            <a:r>
+              <a:rPr lang="en-US" sz="2800" dirty="0">
+                <a:hlinkClick r:id="rId3"/>
+              </a:rPr>
+              <a:t>https://github.com/Microsoft/UWPCommunityToolkit/issues/727</a:t>
+            </a:r>
+            <a:endParaRPr lang="en-US" sz="2800" dirty="0"/>
+          </a:p>
+          <a:p>
+            <a:pPr marL="457200" indent="-457200">
+              <a:buFont typeface="Arial" panose="020B0604020202020204" pitchFamily="34" charset="0"/>
+              <a:buChar char="•"/>
+            </a:pPr>
+            <a:endParaRPr lang="en-US" sz="2800" dirty="0"/>
+          </a:p>
+          <a:p>
+            <a:pPr marL="457200" indent="-457200">
+              <a:buFont typeface="Arial" panose="020B0604020202020204" pitchFamily="34" charset="0"/>
+              <a:buChar char="•"/>
+            </a:pPr>
+            <a:endParaRPr lang="en-US" sz="3100" dirty="0"/>
+          </a:p>
+          <a:p>
+            <a:pPr marL="457200" indent="-457200">
+              <a:buFont typeface="Arial" panose="020B0604020202020204" pitchFamily="34" charset="0"/>
+              <a:buChar char="•"/>
+            </a:pPr>
+            <a:endParaRPr lang="en-US" sz="3100" dirty="0"/>
+          </a:p>
+        </p:txBody>
+      </p:sp>
+      <p:sp>
+        <p:nvSpPr>
+          <p:cNvPr id="5" name="TextBox 4">
+            <a:extLst>
+              <a:ext uri="{FF2B5EF4-FFF2-40B4-BE49-F238E27FC236}">
+                <a16:creationId xmlns:a16="http://schemas.microsoft.com/office/drawing/2014/main" id="{5939B7F2-B094-4A61-A37A-BABADA1FF051}"/>
+              </a:ext>
+            </a:extLst>
+          </p:cNvPr>
+          <p:cNvSpPr txBox="1"/>
+          <p:nvPr/>
+        </p:nvSpPr>
+        <p:spPr>
+          <a:xfrm>
+            <a:off x="518985" y="6334898"/>
+            <a:ext cx="1933543" cy="369332"/>
+          </a:xfrm>
+          <a:prstGeom prst="rect">
+            <a:avLst/>
+          </a:prstGeom>
+          <a:noFill/>
+        </p:spPr>
+        <p:txBody>
+          <a:bodyPr wrap="none" rtlCol="0">
+            <a:spAutoFit/>
+          </a:bodyPr>
+          <a:lstStyle/>
+          <a:p>
+            <a:r>
+              <a:rPr lang="en-US" dirty="0"/>
+              <a:t>@</a:t>
+            </a:r>
+            <a:r>
+              <a:rPr lang="en-US" dirty="0" err="1"/>
+              <a:t>SpilledMilkCOM</a:t>
+            </a:r>
+            <a:endParaRPr lang="en-US" dirty="0"/>
+          </a:p>
+        </p:txBody>
+      </p:sp>
+      <p:pic>
+        <p:nvPicPr>
+          <p:cNvPr id="6" name="Picture 5">
+            <a:extLst>
+              <a:ext uri="{FF2B5EF4-FFF2-40B4-BE49-F238E27FC236}">
+                <a16:creationId xmlns:a16="http://schemas.microsoft.com/office/drawing/2014/main" id="{8C485CEF-569C-4E99-A23A-7BBB2DA3B4D3}"/>
+              </a:ext>
+            </a:extLst>
+          </p:cNvPr>
+          <p:cNvPicPr>
+            <a:picLocks noChangeAspect="1"/>
+          </p:cNvPicPr>
+          <p:nvPr/>
+        </p:nvPicPr>
+        <p:blipFill>
+          <a:blip r:embed="rId4"/>
+          <a:stretch>
+            <a:fillRect/>
+          </a:stretch>
+        </p:blipFill>
+        <p:spPr>
+          <a:xfrm>
+            <a:off x="81934" y="6318422"/>
+            <a:ext cx="437051" cy="301415"/>
+          </a:xfrm>
+          <a:prstGeom prst="rect">
+            <a:avLst/>
+          </a:prstGeom>
+        </p:spPr>
+      </p:pic>
+    </p:spTree>
+    <p:extLst>
+      <p:ext uri="{BB962C8B-B14F-4D97-AF65-F5344CB8AC3E}">
+        <p14:creationId xmlns:p14="http://schemas.microsoft.com/office/powerpoint/2010/main" val="1637028176"/>
+      </p:ext>
+    </p:extLst>
+  </p:cSld>
+  <p:clrMapOvr>
+    <a:masterClrMapping/>
+  </p:clrMapOvr>
+</p:sld>
+</file>
+
+<file path=ppt/slides/slide16.xml><?xml version="1.0" encoding="utf-8"?>
 <p:sld xmlns:a="http://schemas.openxmlformats.org/drawingml/2006/main" xmlns:r="http://schemas.openxmlformats.org/officeDocument/2006/relationships" xmlns:p="http://schemas.openxmlformats.org/presentationml/2006/main">
   <p:cSld>
     <p:spTree>
@@ -8211,8 +8509,8 @@
         </p:nvSpPr>
         <p:spPr>
           <a:xfrm>
-            <a:off x="829887" y="1603079"/>
-            <a:ext cx="10532226" cy="4401205"/>
+            <a:off x="3858935" y="1518407"/>
+            <a:ext cx="7503177" cy="4154984"/>
           </a:xfrm>
           <a:prstGeom prst="rect">
             <a:avLst/>
@@ -8225,90 +8523,64 @@
           </a:bodyPr>
           <a:lstStyle/>
           <a:p>
-            <a:pPr marL="457200" indent="-457200">
-              <a:buFont typeface="Arial" panose="020B0604020202020204" pitchFamily="34" charset="0"/>
-              <a:buChar char="•"/>
-            </a:pPr>
-            <a:r>
-              <a:rPr lang="en-US" sz="2800" dirty="0"/>
+            <a:r>
+              <a:rPr lang="en-US" sz="2400" dirty="0"/>
               <a:t>YES, it's true...  I may not be a Master Builder.</a:t>
             </a:r>
           </a:p>
           <a:p>
-            <a:pPr marL="457200" indent="-457200">
-              <a:buFont typeface="Arial" panose="020B0604020202020204" pitchFamily="34" charset="0"/>
-              <a:buChar char="•"/>
-            </a:pPr>
-            <a:r>
-              <a:rPr lang="en-US" sz="2800" dirty="0"/>
-              <a:t>I may not have a lot of experience fighting, or leading, or coming up with plans.  Or having ideas in general.</a:t>
-            </a:r>
-          </a:p>
-          <a:p>
-            <a:pPr marL="457200" indent="-457200">
-              <a:buFont typeface="Arial" panose="020B0604020202020204" pitchFamily="34" charset="0"/>
-              <a:buChar char="•"/>
-            </a:pPr>
-            <a:r>
-              <a:rPr lang="en-US" sz="2800" dirty="0"/>
+            <a:r>
+              <a:rPr lang="en-US" sz="2400" dirty="0"/>
+              <a:t>I may not have a lot of experience fighting, or leading, or coming up with plans.</a:t>
+            </a:r>
+          </a:p>
+          <a:p>
+            <a:r>
+              <a:rPr lang="en-US" sz="2400" dirty="0"/>
+              <a:t>Or having ideas in general.</a:t>
+            </a:r>
+          </a:p>
+          <a:p>
+            <a:r>
+              <a:rPr lang="en-US" sz="2400" dirty="0"/>
               <a:t>In FACT, I'm not all that SMART.</a:t>
             </a:r>
           </a:p>
           <a:p>
-            <a:pPr marL="457200" indent="-457200">
-              <a:buFont typeface="Arial" panose="020B0604020202020204" pitchFamily="34" charset="0"/>
-              <a:buChar char="•"/>
-            </a:pPr>
-            <a:r>
-              <a:rPr lang="en-US" sz="2800" dirty="0"/>
+            <a:r>
+              <a:rPr lang="en-US" sz="2400" dirty="0"/>
               <a:t>And I'm NOT what you call a creative type.</a:t>
             </a:r>
           </a:p>
           <a:p>
-            <a:pPr marL="457200" indent="-457200">
-              <a:buFont typeface="Arial" panose="020B0604020202020204" pitchFamily="34" charset="0"/>
-              <a:buChar char="•"/>
-            </a:pPr>
-            <a:r>
-              <a:rPr lang="en-US" sz="2800" dirty="0"/>
-              <a:t>Plus.  Generally, unskilled.</a:t>
-            </a:r>
-          </a:p>
-          <a:p>
-            <a:pPr marL="457200" indent="-457200">
-              <a:buFont typeface="Arial" panose="020B0604020202020204" pitchFamily="34" charset="0"/>
-              <a:buChar char="•"/>
-            </a:pPr>
-            <a:r>
-              <a:rPr lang="en-US" sz="2800" dirty="0"/>
-              <a:t>Also, scared and cowardly.</a:t>
-            </a:r>
-          </a:p>
-          <a:p>
-            <a:pPr marL="457200" indent="-457200">
-              <a:buFont typeface="Arial" panose="020B0604020202020204" pitchFamily="34" charset="0"/>
-              <a:buChar char="•"/>
-            </a:pPr>
-            <a:r>
-              <a:rPr lang="en-US" sz="2800" dirty="0"/>
+            <a:r>
+              <a:rPr lang="en-US" sz="2400" dirty="0"/>
+              <a:t>Plus…  Generally, unskilled.</a:t>
+            </a:r>
+          </a:p>
+          <a:p>
+            <a:r>
+              <a:rPr lang="en-US" sz="2400" dirty="0"/>
+              <a:t>Also… Scared and cowardly.</a:t>
+            </a:r>
+          </a:p>
+          <a:p>
+            <a:r>
+              <a:rPr lang="en-US" sz="2400" dirty="0"/>
               <a:t>I know what you're thinking.  He is the LEAST qualified person in the world to lead us.  And you are RIGHT.</a:t>
             </a:r>
           </a:p>
           <a:p>
-            <a:pPr marL="457200" indent="-457200">
-              <a:buFont typeface="Arial" panose="020B0604020202020204" pitchFamily="34" charset="0"/>
-              <a:buChar char="•"/>
-            </a:pPr>
-            <a:r>
-              <a:rPr lang="en-US" sz="2800" dirty="0"/>
+            <a:r>
+              <a:rPr lang="en-US" sz="2400" dirty="0"/>
               <a:t>There was about to be a </a:t>
             </a:r>
             <a:r>
-              <a:rPr lang="en-US" sz="2800" dirty="0" err="1"/>
+              <a:rPr lang="en-US" sz="2400" dirty="0" err="1"/>
               <a:t>buuut</a:t>
             </a:r>
             <a:r>
-              <a:rPr lang="en-US" sz="2800" dirty="0"/>
+              <a:rPr lang="en-US" sz="2400" dirty="0"/>
               <a:t>.</a:t>
             </a:r>
           </a:p>
@@ -8369,7 +8641,7 @@
           <p:nvPr/>
         </p:nvPicPr>
         <p:blipFill>
-          <a:blip r:embed="rId2"/>
+          <a:blip r:embed="rId3"/>
           <a:stretch>
             <a:fillRect/>
           </a:stretch>
@@ -8378,6 +8650,39 @@
           <a:xfrm>
             <a:off x="81934" y="6318422"/>
             <a:ext cx="437051" cy="301415"/>
+          </a:xfrm>
+          <a:prstGeom prst="rect">
+            <a:avLst/>
+          </a:prstGeom>
+        </p:spPr>
+      </p:pic>
+      <p:pic>
+        <p:nvPicPr>
+          <p:cNvPr id="5" name="p2NQdtNbqUE">
+            <a:hlinkClick r:id="" action="ppaction://media"/>
+            <a:extLst>
+              <a:ext uri="{FF2B5EF4-FFF2-40B4-BE49-F238E27FC236}">
+                <a16:creationId xmlns:a16="http://schemas.microsoft.com/office/drawing/2014/main" id="{29C871F8-06AE-4B73-B310-8EFB7473669F}"/>
+              </a:ext>
+            </a:extLst>
+          </p:cNvPr>
+          <p:cNvPicPr>
+            <a:picLocks noRot="1" noChangeAspect="1"/>
+          </p:cNvPicPr>
+          <p:nvPr>
+            <a:videoFile r:link="rId1"/>
+          </p:nvPr>
+        </p:nvPicPr>
+        <p:blipFill>
+          <a:blip r:embed="rId4"/>
+          <a:stretch>
+            <a:fillRect/>
+          </a:stretch>
+        </p:blipFill>
+        <p:spPr>
+          <a:xfrm>
+            <a:off x="184556" y="1725185"/>
+            <a:ext cx="3447877" cy="2585908"/>
           </a:xfrm>
           <a:prstGeom prst="rect">
             <a:avLst/>
@@ -8688,7 +8993,7 @@
         <p:spPr>
           <a:xfrm>
             <a:off x="839585" y="2044931"/>
-            <a:ext cx="10532226" cy="3539430"/>
+            <a:ext cx="10532226" cy="4031873"/>
           </a:xfrm>
           <a:prstGeom prst="rect">
             <a:avLst/>
@@ -8717,7 +9022,7 @@
             </a:pPr>
             <a:r>
               <a:rPr lang="en-US" sz="3200" dirty="0"/>
-              <a:t>Me, Me, Me</a:t>
+              <a:t>What this is NOT!</a:t>
             </a:r>
           </a:p>
           <a:p>
@@ -8727,7 +9032,7 @@
             </a:pPr>
             <a:r>
               <a:rPr lang="en-US" sz="3200" dirty="0"/>
-              <a:t>WWJD?</a:t>
+              <a:t>Me, Me, Me</a:t>
             </a:r>
           </a:p>
           <a:p>
@@ -8737,7 +9042,7 @@
             </a:pPr>
             <a:r>
               <a:rPr lang="en-US" sz="3200" dirty="0"/>
-              <a:t>What would YOU do?</a:t>
+              <a:t>WWJD?</a:t>
             </a:r>
           </a:p>
           <a:p>
@@ -8747,7 +9052,7 @@
             </a:pPr>
             <a:r>
               <a:rPr lang="en-US" sz="3200" dirty="0"/>
-              <a:t>UWP Community Toolkit (tiny contributions)</a:t>
+              <a:t>What would YOU do?</a:t>
             </a:r>
           </a:p>
           <a:p>
@@ -8757,7 +9062,17 @@
             </a:pPr>
             <a:r>
               <a:rPr lang="en-US" sz="3200" dirty="0"/>
-              <a:t>Questions, Contact Info, and hurry off to LUNCH…</a:t>
+              <a:t>UWP Community Toolkit (tiny contributions)</a:t>
+            </a:r>
+          </a:p>
+          <a:p>
+            <a:pPr marL="457200" indent="-457200">
+              <a:buFont typeface="Arial" panose="020B0604020202020204" pitchFamily="34" charset="0"/>
+              <a:buChar char="•"/>
+            </a:pPr>
+            <a:r>
+              <a:rPr lang="en-US" sz="3200" dirty="0"/>
+              <a:t>Questions, Contact Info, and get back to your nap…</a:t>
             </a:r>
           </a:p>
           <a:p>
@@ -9096,7 +9411,7 @@
           <a:p>
             <a:r>
               <a:rPr lang="en-US" dirty="0"/>
-              <a:t>Me, me, me</a:t>
+              <a:t>What this is not</a:t>
             </a:r>
           </a:p>
         </p:txBody>
@@ -9116,7 +9431,7 @@
         <p:spPr>
           <a:xfrm>
             <a:off x="839585" y="2044931"/>
-            <a:ext cx="10532226" cy="3908762"/>
+            <a:ext cx="10532226" cy="2477601"/>
           </a:xfrm>
           <a:prstGeom prst="rect">
             <a:avLst/>
@@ -9135,7 +9450,7 @@
             </a:pPr>
             <a:r>
               <a:rPr lang="en-US" sz="3100" dirty="0"/>
-              <a:t>Not enough time</a:t>
+              <a:t>NOT a UWP tutorial</a:t>
             </a:r>
           </a:p>
           <a:p>
@@ -9145,7 +9460,7 @@
             </a:pPr>
             <a:r>
               <a:rPr lang="en-US" sz="3100" dirty="0"/>
-              <a:t>Vacation Day</a:t>
+              <a:t>NOT a GitHub tutorial</a:t>
             </a:r>
           </a:p>
           <a:p>
@@ -9155,7 +9470,7 @@
             </a:pPr>
             <a:r>
               <a:rPr lang="en-US" sz="3100" dirty="0"/>
-              <a:t>I know stuff</a:t>
+              <a:t>NOT a Twitter tutorial</a:t>
             </a:r>
           </a:p>
           <a:p>
@@ -9165,37 +9480,7 @@
             </a:pPr>
             <a:r>
               <a:rPr lang="en-US" sz="3100" dirty="0"/>
-              <a:t>Giving stuff away</a:t>
-            </a:r>
-          </a:p>
-          <a:p>
-            <a:pPr marL="457200" indent="-457200">
-              <a:buFont typeface="Arial" panose="020B0604020202020204" pitchFamily="34" charset="0"/>
-              <a:buChar char="•"/>
-            </a:pPr>
-            <a:r>
-              <a:rPr lang="en-US" sz="3100" dirty="0"/>
-              <a:t>Selfish reasons</a:t>
-            </a:r>
-          </a:p>
-          <a:p>
-            <a:pPr marL="457200" indent="-457200">
-              <a:buFont typeface="Arial" panose="020B0604020202020204" pitchFamily="34" charset="0"/>
-              <a:buChar char="•"/>
-            </a:pPr>
-            <a:r>
-              <a:rPr lang="en-US" sz="3100" dirty="0"/>
-              <a:t>Free apps</a:t>
-            </a:r>
-          </a:p>
-          <a:p>
-            <a:pPr marL="457200" indent="-457200">
-              <a:buFont typeface="Arial" panose="020B0604020202020204" pitchFamily="34" charset="0"/>
-              <a:buChar char="•"/>
-            </a:pPr>
-            <a:r>
-              <a:rPr lang="en-US" sz="3100" dirty="0"/>
-              <a:t>“You’re ROYALTY! Why do you work?”</a:t>
+              <a:t>I know enough to get by and be dangerous</a:t>
             </a:r>
           </a:p>
           <a:p>
@@ -9280,7 +9565,7 @@
     </p:spTree>
     <p:extLst>
       <p:ext uri="{BB962C8B-B14F-4D97-AF65-F5344CB8AC3E}">
-        <p14:creationId xmlns:p14="http://schemas.microsoft.com/office/powerpoint/2010/main" val="1539700143"/>
+        <p14:creationId xmlns:p14="http://schemas.microsoft.com/office/powerpoint/2010/main" val="2562519046"/>
       </p:ext>
     </p:extLst>
   </p:cSld>
@@ -9330,7 +9615,7 @@
           <a:p>
             <a:r>
               <a:rPr lang="en-US" dirty="0"/>
-              <a:t>A little history lesson</a:t>
+              <a:t>Me, me, me</a:t>
             </a:r>
           </a:p>
         </p:txBody>
@@ -9369,7 +9654,7 @@
             </a:pPr>
             <a:r>
               <a:rPr lang="en-US" sz="3100" dirty="0"/>
-              <a:t>1983 Gallagher Power Fence Inventory</a:t>
+              <a:t>Not enough time</a:t>
             </a:r>
           </a:p>
           <a:p>
@@ -9379,13 +9664,8 @@
             </a:pPr>
             <a:r>
               <a:rPr lang="en-US" sz="3100" dirty="0"/>
-              <a:t>1991 </a:t>
-            </a:r>
-            <a:r>
-              <a:rPr lang="en-US" sz="3100" dirty="0" err="1"/>
-              <a:t>XmMotif</a:t>
-            </a:r>
-            <a:endParaRPr lang="en-US" sz="3100" dirty="0"/>
+              <a:t>Vacation Day</a:t>
+            </a:r>
           </a:p>
           <a:p>
             <a:pPr marL="457200" indent="-457200">
@@ -9394,15 +9674,7 @@
             </a:pPr>
             <a:r>
               <a:rPr lang="en-US" sz="3100" dirty="0"/>
-              <a:t>1992 Space War (</a:t>
-            </a:r>
-            <a:r>
-              <a:rPr lang="en-US" sz="3100" dirty="0" err="1"/>
-              <a:t>Xwindows</a:t>
-            </a:r>
-            <a:r>
-              <a:rPr lang="en-US" sz="3100" dirty="0"/>
-              <a:t>)</a:t>
+              <a:t>I know stuff</a:t>
             </a:r>
           </a:p>
           <a:p>
@@ -9412,7 +9684,7 @@
             </a:pPr>
             <a:r>
               <a:rPr lang="en-US" sz="3100" dirty="0"/>
-              <a:t>1997 The Master-List</a:t>
+              <a:t>Giving stuff away</a:t>
             </a:r>
           </a:p>
           <a:p>
@@ -9422,7 +9694,7 @@
             </a:pPr>
             <a:r>
               <a:rPr lang="en-US" sz="3100" dirty="0"/>
-              <a:t>1998 eBay (what should I sell?)</a:t>
+              <a:t>Selfish reasons</a:t>
             </a:r>
           </a:p>
           <a:p>
@@ -9432,7 +9704,7 @@
             </a:pPr>
             <a:r>
               <a:rPr lang="en-US" sz="3100" dirty="0"/>
-              <a:t>2013 Twitter sticky tweet</a:t>
+              <a:t>Free apps</a:t>
             </a:r>
           </a:p>
           <a:p>
@@ -9442,7 +9714,7 @@
             </a:pPr>
             <a:r>
               <a:rPr lang="en-US" sz="3100" dirty="0"/>
-              <a:t>Constantly thinking…  Brain NEVER shuts off!</a:t>
+              <a:t>“You’re ROYALTY! Why do you work?”</a:t>
             </a:r>
           </a:p>
           <a:p>
@@ -9527,7 +9799,7 @@
     </p:spTree>
     <p:extLst>
       <p:ext uri="{BB962C8B-B14F-4D97-AF65-F5344CB8AC3E}">
-        <p14:creationId xmlns:p14="http://schemas.microsoft.com/office/powerpoint/2010/main" val="620286551"/>
+        <p14:creationId xmlns:p14="http://schemas.microsoft.com/office/powerpoint/2010/main" val="1539700143"/>
       </p:ext>
     </p:extLst>
   </p:cSld>

</xml_diff>

<commit_message>
Added new sponsors to PP deck
</commit_message>
<xml_diff>
--- a/Giving Back.pptx
+++ b/Giving Back.pptx
@@ -302,7 +302,7 @@
           <a:p>
             <a:fld id="{48A87A34-81AB-432B-8DAE-1953F412C126}" type="datetimeFigureOut">
               <a:rPr lang="en-US" dirty="0"/>
-              <a:t>6/19/2017</a:t>
+              <a:t>6/22/2017</a:t>
             </a:fld>
             <a:endParaRPr lang="en-US" dirty="0"/>
           </a:p>
@@ -612,7 +612,7 @@
           <a:p>
             <a:fld id="{48A87A34-81AB-432B-8DAE-1953F412C126}" type="datetimeFigureOut">
               <a:rPr lang="en-US" dirty="0"/>
-              <a:t>6/19/2017</a:t>
+              <a:t>6/22/2017</a:t>
             </a:fld>
             <a:endParaRPr lang="en-US" dirty="0"/>
           </a:p>
@@ -829,7 +829,7 @@
           <a:p>
             <a:fld id="{48A87A34-81AB-432B-8DAE-1953F412C126}" type="datetimeFigureOut">
               <a:rPr lang="en-US" dirty="0"/>
-              <a:t>6/19/2017</a:t>
+              <a:t>6/22/2017</a:t>
             </a:fld>
             <a:endParaRPr lang="en-US" dirty="0"/>
           </a:p>
@@ -1115,7 +1115,7 @@
           <a:p>
             <a:fld id="{48A87A34-81AB-432B-8DAE-1953F412C126}" type="datetimeFigureOut">
               <a:rPr lang="en-US" dirty="0"/>
-              <a:t>6/19/2017</a:t>
+              <a:t>6/22/2017</a:t>
             </a:fld>
             <a:endParaRPr lang="en-US" dirty="0"/>
           </a:p>
@@ -1564,7 +1564,7 @@
           <a:p>
             <a:fld id="{48A87A34-81AB-432B-8DAE-1953F412C126}" type="datetimeFigureOut">
               <a:rPr lang="en-US" dirty="0"/>
-              <a:t>6/19/2017</a:t>
+              <a:t>6/22/2017</a:t>
             </a:fld>
             <a:endParaRPr lang="en-US" dirty="0"/>
           </a:p>
@@ -2135,7 +2135,7 @@
           <a:p>
             <a:fld id="{48A87A34-81AB-432B-8DAE-1953F412C126}" type="datetimeFigureOut">
               <a:rPr lang="en-US" dirty="0"/>
-              <a:t>6/19/2017</a:t>
+              <a:t>6/22/2017</a:t>
             </a:fld>
             <a:endParaRPr lang="en-US" dirty="0"/>
           </a:p>
@@ -2991,7 +2991,7 @@
           <a:p>
             <a:fld id="{48A87A34-81AB-432B-8DAE-1953F412C126}" type="datetimeFigureOut">
               <a:rPr lang="en-US" dirty="0"/>
-              <a:t>6/19/2017</a:t>
+              <a:t>6/22/2017</a:t>
             </a:fld>
             <a:endParaRPr lang="en-US" dirty="0"/>
           </a:p>
@@ -3191,7 +3191,7 @@
           <a:p>
             <a:fld id="{48A87A34-81AB-432B-8DAE-1953F412C126}" type="datetimeFigureOut">
               <a:rPr lang="en-US" dirty="0"/>
-              <a:t>6/19/2017</a:t>
+              <a:t>6/22/2017</a:t>
             </a:fld>
             <a:endParaRPr lang="en-US" dirty="0"/>
           </a:p>
@@ -3400,7 +3400,7 @@
           <a:p>
             <a:fld id="{48A87A34-81AB-432B-8DAE-1953F412C126}" type="datetimeFigureOut">
               <a:rPr lang="en-US" dirty="0"/>
-              <a:t>6/19/2017</a:t>
+              <a:t>6/22/2017</a:t>
             </a:fld>
             <a:endParaRPr lang="en-US" dirty="0"/>
           </a:p>
@@ -3600,7 +3600,7 @@
           <a:p>
             <a:fld id="{48A87A34-81AB-432B-8DAE-1953F412C126}" type="datetimeFigureOut">
               <a:rPr lang="en-US" dirty="0"/>
-              <a:t>6/19/2017</a:t>
+              <a:t>6/22/2017</a:t>
             </a:fld>
             <a:endParaRPr lang="en-US" dirty="0"/>
           </a:p>
@@ -3875,7 +3875,7 @@
           <a:p>
             <a:fld id="{48A87A34-81AB-432B-8DAE-1953F412C126}" type="datetimeFigureOut">
               <a:rPr lang="en-US" dirty="0"/>
-              <a:t>6/19/2017</a:t>
+              <a:t>6/22/2017</a:t>
             </a:fld>
             <a:endParaRPr lang="en-US" dirty="0"/>
           </a:p>
@@ -4137,7 +4137,7 @@
           <a:p>
             <a:fld id="{48A87A34-81AB-432B-8DAE-1953F412C126}" type="datetimeFigureOut">
               <a:rPr lang="en-US" dirty="0"/>
-              <a:t>6/19/2017</a:t>
+              <a:t>6/22/2017</a:t>
             </a:fld>
             <a:endParaRPr lang="en-US" dirty="0"/>
           </a:p>
@@ -4547,7 +4547,7 @@
           <a:p>
             <a:fld id="{48A87A34-81AB-432B-8DAE-1953F412C126}" type="datetimeFigureOut">
               <a:rPr lang="en-US" dirty="0"/>
-              <a:t>6/19/2017</a:t>
+              <a:t>6/22/2017</a:t>
             </a:fld>
             <a:endParaRPr lang="en-US" dirty="0"/>
           </a:p>
@@ -4690,7 +4690,7 @@
           <a:p>
             <a:fld id="{48A87A34-81AB-432B-8DAE-1953F412C126}" type="datetimeFigureOut">
               <a:rPr lang="en-US" dirty="0"/>
-              <a:t>6/19/2017</a:t>
+              <a:t>6/22/2017</a:t>
             </a:fld>
             <a:endParaRPr lang="en-US" dirty="0"/>
           </a:p>
@@ -4810,7 +4810,7 @@
           <a:p>
             <a:fld id="{48A87A34-81AB-432B-8DAE-1953F412C126}" type="datetimeFigureOut">
               <a:rPr lang="en-US" dirty="0"/>
-              <a:t>6/19/2017</a:t>
+              <a:t>6/22/2017</a:t>
             </a:fld>
             <a:endParaRPr lang="en-US" dirty="0"/>
           </a:p>
@@ -5084,7 +5084,7 @@
           <a:p>
             <a:fld id="{48A87A34-81AB-432B-8DAE-1953F412C126}" type="datetimeFigureOut">
               <a:rPr lang="en-US" dirty="0"/>
-              <a:t>6/19/2017</a:t>
+              <a:t>6/22/2017</a:t>
             </a:fld>
             <a:endParaRPr lang="en-US" dirty="0"/>
           </a:p>
@@ -5394,7 +5394,7 @@
           <a:p>
             <a:fld id="{48A87A34-81AB-432B-8DAE-1953F412C126}" type="datetimeFigureOut">
               <a:rPr lang="en-US" dirty="0"/>
-              <a:t>6/19/2017</a:t>
+              <a:t>6/22/2017</a:t>
             </a:fld>
             <a:endParaRPr lang="en-US" dirty="0"/>
           </a:p>
@@ -5643,7 +5643,7 @@
             <a:fld id="{48A87A34-81AB-432B-8DAE-1953F412C126}" type="datetimeFigureOut">
               <a:rPr lang="en-US" dirty="0"/>
               <a:pPr/>
-              <a:t>6/19/2017</a:t>
+              <a:t>6/22/2017</a:t>
             </a:fld>
             <a:endParaRPr lang="en-US" dirty="0"/>
           </a:p>
@@ -6151,8 +6151,8 @@
         </p:nvSpPr>
         <p:spPr>
           <a:xfrm>
-            <a:off x="2092411" y="2232454"/>
-            <a:ext cx="7463481" cy="3772930"/>
+            <a:off x="1409351" y="1728132"/>
+            <a:ext cx="9219500" cy="4277253"/>
           </a:xfrm>
           <a:prstGeom prst="rect">
             <a:avLst/>
@@ -6213,8 +6213,8 @@
         </p:blipFill>
         <p:spPr>
           <a:xfrm>
-            <a:off x="4063510" y="3789390"/>
-            <a:ext cx="4138946" cy="1336952"/>
+            <a:off x="2132769" y="2913845"/>
+            <a:ext cx="3301146" cy="1066328"/>
           </a:xfrm>
           <a:prstGeom prst="rect">
             <a:avLst/>
@@ -6243,8 +6243,8 @@
         </p:blipFill>
         <p:spPr>
           <a:xfrm>
-            <a:off x="3724513" y="2439632"/>
-            <a:ext cx="4816941" cy="1771881"/>
+            <a:off x="5528002" y="1719842"/>
+            <a:ext cx="3607465" cy="1326983"/>
           </a:xfrm>
           <a:prstGeom prst="rect">
             <a:avLst/>
@@ -6273,7 +6273,7 @@
         </p:blipFill>
         <p:spPr>
           <a:xfrm>
-            <a:off x="2886716" y="1043103"/>
+            <a:off x="1950363" y="992901"/>
             <a:ext cx="3254825" cy="1629445"/>
           </a:xfrm>
           <a:prstGeom prst="rect">
@@ -6303,8 +6303,8 @@
         </p:blipFill>
         <p:spPr>
           <a:xfrm>
-            <a:off x="4246338" y="5050309"/>
-            <a:ext cx="3773291" cy="764588"/>
+            <a:off x="6231784" y="3126472"/>
+            <a:ext cx="3163742" cy="641074"/>
           </a:xfrm>
           <a:prstGeom prst="rect">
             <a:avLst/>
@@ -6319,8 +6319,8 @@
         </p:nvSpPr>
         <p:spPr>
           <a:xfrm>
-            <a:off x="6563028" y="1056472"/>
-            <a:ext cx="2742255" cy="807914"/>
+            <a:off x="6518250" y="398552"/>
+            <a:ext cx="3422565" cy="1054135"/>
           </a:xfrm>
           <a:prstGeom prst="rect">
             <a:avLst/>
@@ -6429,7 +6429,7 @@
           <a:p>
             <a:pPr algn="r"/>
             <a:r>
-              <a:rPr lang="en-US" sz="2400" b="1" dirty="0">
+              <a:rPr lang="en-US" sz="3200" b="1" dirty="0">
                 <a:latin typeface="Arial" panose="020B0604020202020204" pitchFamily="34" charset="0"/>
                 <a:cs typeface="Arial" panose="020B0604020202020204" pitchFamily="34" charset="0"/>
               </a:rPr>
@@ -6439,7 +6439,7 @@
           <a:p>
             <a:pPr algn="r"/>
             <a:r>
-              <a:rPr lang="en-US" sz="2400" b="1" dirty="0">
+              <a:rPr lang="en-US" sz="3200" b="1" dirty="0">
                 <a:latin typeface="Arial" panose="020B0604020202020204" pitchFamily="34" charset="0"/>
                 <a:cs typeface="Arial" panose="020B0604020202020204" pitchFamily="34" charset="0"/>
               </a:rPr>
@@ -6464,14 +6464,226 @@
         </p:blipFill>
         <p:spPr>
           <a:xfrm>
-            <a:off x="247131" y="5370656"/>
-            <a:ext cx="1219203" cy="1280164"/>
+            <a:off x="247132" y="5976613"/>
+            <a:ext cx="642101" cy="674206"/>
           </a:xfrm>
           <a:prstGeom prst="rect">
             <a:avLst/>
           </a:prstGeom>
         </p:spPr>
       </p:pic>
+      <p:pic>
+        <p:nvPicPr>
+          <p:cNvPr id="10" name="Picture 9">
+            <a:extLst>
+              <a:ext uri="{FF2B5EF4-FFF2-40B4-BE49-F238E27FC236}">
+                <a16:creationId xmlns:a16="http://schemas.microsoft.com/office/drawing/2014/main" id="{42E0ACFF-9DB9-4AF0-9EC0-BA477AE0F636}"/>
+              </a:ext>
+            </a:extLst>
+          </p:cNvPr>
+          <p:cNvPicPr>
+            <a:picLocks noChangeAspect="1"/>
+          </p:cNvPicPr>
+          <p:nvPr/>
+        </p:nvPicPr>
+        <p:blipFill>
+          <a:blip r:embed="rId7">
+            <a:extLst>
+              <a:ext uri="{28A0092B-C50C-407E-A947-70E740481C1C}">
+                <a14:useLocalDpi xmlns:a14="http://schemas.microsoft.com/office/drawing/2010/main" val="0"/>
+              </a:ext>
+            </a:extLst>
+          </a:blip>
+          <a:stretch>
+            <a:fillRect/>
+          </a:stretch>
+        </p:blipFill>
+        <p:spPr>
+          <a:xfrm>
+            <a:off x="4764117" y="4042991"/>
+            <a:ext cx="2124076" cy="509777"/>
+          </a:xfrm>
+          <a:prstGeom prst="rect">
+            <a:avLst/>
+          </a:prstGeom>
+        </p:spPr>
+      </p:pic>
+      <p:sp>
+        <p:nvSpPr>
+          <p:cNvPr id="3" name="Rectangle: Rounded Corners 2">
+            <a:extLst>
+              <a:ext uri="{FF2B5EF4-FFF2-40B4-BE49-F238E27FC236}">
+                <a16:creationId xmlns:a16="http://schemas.microsoft.com/office/drawing/2014/main" id="{DD8BC6A4-1D27-41B4-AB0B-CAC0905F1EBE}"/>
+              </a:ext>
+            </a:extLst>
+          </p:cNvPr>
+          <p:cNvSpPr/>
+          <p:nvPr/>
+        </p:nvSpPr>
+        <p:spPr>
+          <a:xfrm>
+            <a:off x="1560351" y="4915949"/>
+            <a:ext cx="8942665" cy="998290"/>
+          </a:xfrm>
+          <a:prstGeom prst="roundRect">
+            <a:avLst/>
+          </a:prstGeom>
+          <a:solidFill>
+            <a:schemeClr val="accent3">
+              <a:lumMod val="20000"/>
+              <a:lumOff val="80000"/>
+            </a:schemeClr>
+          </a:solidFill>
+          <a:ln>
+            <a:solidFill>
+              <a:schemeClr val="accent4">
+                <a:lumMod val="50000"/>
+              </a:schemeClr>
+            </a:solidFill>
+          </a:ln>
+        </p:spPr>
+        <p:style>
+          <a:lnRef idx="2">
+            <a:schemeClr val="accent1">
+              <a:shade val="50000"/>
+            </a:schemeClr>
+          </a:lnRef>
+          <a:fillRef idx="1">
+            <a:schemeClr val="accent1"/>
+          </a:fillRef>
+          <a:effectRef idx="0">
+            <a:schemeClr val="accent1"/>
+          </a:effectRef>
+          <a:fontRef idx="minor">
+            <a:schemeClr val="lt1"/>
+          </a:fontRef>
+        </p:style>
+        <p:txBody>
+          <a:bodyPr rtlCol="0" anchor="ctr"/>
+          <a:lstStyle/>
+          <a:p>
+            <a:pPr algn="ctr"/>
+            <a:endParaRPr lang="en-US"/>
+          </a:p>
+        </p:txBody>
+      </p:sp>
+      <p:pic>
+        <p:nvPicPr>
+          <p:cNvPr id="12" name="Picture 11">
+            <a:extLst>
+              <a:ext uri="{FF2B5EF4-FFF2-40B4-BE49-F238E27FC236}">
+                <a16:creationId xmlns:a16="http://schemas.microsoft.com/office/drawing/2014/main" id="{5B31509D-FF12-479B-8C0F-781BD42D5099}"/>
+              </a:ext>
+            </a:extLst>
+          </p:cNvPr>
+          <p:cNvPicPr>
+            <a:picLocks noChangeAspect="1"/>
+          </p:cNvPicPr>
+          <p:nvPr/>
+        </p:nvPicPr>
+        <p:blipFill>
+          <a:blip r:embed="rId8" cstate="print">
+            <a:extLst>
+              <a:ext uri="{28A0092B-C50C-407E-A947-70E740481C1C}">
+                <a14:useLocalDpi xmlns:a14="http://schemas.microsoft.com/office/drawing/2010/main" val="0"/>
+              </a:ext>
+            </a:extLst>
+          </a:blip>
+          <a:stretch>
+            <a:fillRect/>
+          </a:stretch>
+        </p:blipFill>
+        <p:spPr>
+          <a:xfrm>
+            <a:off x="1822816" y="5128576"/>
+            <a:ext cx="2136182" cy="670677"/>
+          </a:xfrm>
+          <a:prstGeom prst="rect">
+            <a:avLst/>
+          </a:prstGeom>
+        </p:spPr>
+      </p:pic>
+      <p:sp>
+        <p:nvSpPr>
+          <p:cNvPr id="14" name="TextBox 13">
+            <a:extLst>
+              <a:ext uri="{FF2B5EF4-FFF2-40B4-BE49-F238E27FC236}">
+                <a16:creationId xmlns:a16="http://schemas.microsoft.com/office/drawing/2014/main" id="{670C00BF-5F8D-43D2-89AB-8F74E60E5017}"/>
+              </a:ext>
+            </a:extLst>
+          </p:cNvPr>
+          <p:cNvSpPr txBox="1"/>
+          <p:nvPr/>
+        </p:nvSpPr>
+        <p:spPr>
+          <a:xfrm>
+            <a:off x="4221462" y="5183963"/>
+            <a:ext cx="6096997" cy="561692"/>
+          </a:xfrm>
+          <a:prstGeom prst="rect">
+            <a:avLst/>
+          </a:prstGeom>
+          <a:noFill/>
+        </p:spPr>
+        <p:txBody>
+          <a:bodyPr wrap="square" lIns="68580" tIns="34290" rIns="68580" bIns="34290" rtlCol="0">
+            <a:spAutoFit/>
+          </a:bodyPr>
+          <a:lstStyle/>
+          <a:p>
+            <a:r>
+              <a:rPr lang="en-US" sz="1600" b="1" dirty="0">
+                <a:solidFill>
+                  <a:schemeClr val="bg1"/>
+                </a:solidFill>
+                <a:latin typeface="Segoe UI Light" panose="020B0502040204020203" pitchFamily="34" charset="0"/>
+                <a:cs typeface="Segoe UI Light" panose="020B0502040204020203" pitchFamily="34" charset="0"/>
+              </a:rPr>
+              <a:t>"Donations by YOU, Denver Dev Day attendees, are provided to support </a:t>
+            </a:r>
+            <a:r>
+              <a:rPr lang="en-US" sz="1600" b="1" dirty="0" err="1">
+                <a:solidFill>
+                  <a:schemeClr val="bg1"/>
+                </a:solidFill>
+                <a:latin typeface="Segoe UI Light" panose="020B0502040204020203" pitchFamily="34" charset="0"/>
+                <a:cs typeface="Segoe UI Light" panose="020B0502040204020203" pitchFamily="34" charset="0"/>
+              </a:rPr>
+              <a:t>KidsTek</a:t>
+            </a:r>
+            <a:r>
+              <a:rPr lang="en-US" sz="1600" b="1" dirty="0">
+                <a:solidFill>
+                  <a:schemeClr val="bg1"/>
+                </a:solidFill>
+                <a:latin typeface="Segoe UI Light" panose="020B0502040204020203" pitchFamily="34" charset="0"/>
+                <a:cs typeface="Segoe UI Light" panose="020B0502040204020203" pitchFamily="34" charset="0"/>
+              </a:rPr>
+              <a:t>, http://kidstek.</a:t>
+            </a:r>
+            <a:r>
+              <a:rPr lang="en-US" sz="1600" b="1">
+                <a:solidFill>
+                  <a:schemeClr val="bg1"/>
+                </a:solidFill>
+                <a:latin typeface="Segoe UI Light" panose="020B0502040204020203" pitchFamily="34" charset="0"/>
+                <a:cs typeface="Segoe UI Light" panose="020B0502040204020203" pitchFamily="34" charset="0"/>
+              </a:rPr>
+              <a:t>org     - </a:t>
+            </a:r>
+            <a:r>
+              <a:rPr lang="en-US" sz="1600" b="1" dirty="0">
+                <a:solidFill>
+                  <a:schemeClr val="bg1"/>
+                </a:solidFill>
+                <a:latin typeface="Segoe UI Light" panose="020B0502040204020203" pitchFamily="34" charset="0"/>
+                <a:cs typeface="Segoe UI Light" panose="020B0502040204020203" pitchFamily="34" charset="0"/>
+              </a:rPr>
+              <a:t>Thank you!"</a:t>
+            </a:r>
+          </a:p>
+        </p:txBody>
+      </p:sp>
     </p:spTree>
     <p:extLst>
       <p:ext uri="{BB962C8B-B14F-4D97-AF65-F5344CB8AC3E}">

</xml_diff>

<commit_message>
Final tweaks to decks.
</commit_message>
<xml_diff>
--- a/Giving Back.pptx
+++ b/Giving Back.pptx
@@ -16,13 +16,14 @@
     <p:sldId id="279" r:id="rId10"/>
     <p:sldId id="282" r:id="rId11"/>
     <p:sldId id="278" r:id="rId12"/>
-    <p:sldId id="271" r:id="rId13"/>
-    <p:sldId id="281" r:id="rId14"/>
-    <p:sldId id="272" r:id="rId15"/>
-    <p:sldId id="286" r:id="rId16"/>
-    <p:sldId id="280" r:id="rId17"/>
+    <p:sldId id="281" r:id="rId13"/>
+    <p:sldId id="272" r:id="rId14"/>
+    <p:sldId id="286" r:id="rId15"/>
+    <p:sldId id="280" r:id="rId16"/>
+    <p:sldId id="287" r:id="rId17"/>
     <p:sldId id="284" r:id="rId18"/>
-    <p:sldId id="258" r:id="rId19"/>
+    <p:sldId id="288" r:id="rId19"/>
+    <p:sldId id="258" r:id="rId20"/>
   </p:sldIdLst>
   <p:sldSz cx="12192000" cy="6858000"/>
   <p:notesSz cx="6858000" cy="9144000"/>
@@ -7180,7 +7181,7 @@
           <a:p>
             <a:r>
               <a:rPr lang="en-US" dirty="0"/>
-              <a:t>WWJD?</a:t>
+              <a:t>FOLLOW THE PROCESS (or don’t)</a:t>
             </a:r>
           </a:p>
         </p:txBody>
@@ -7200,7 +7201,7 @@
         <p:spPr>
           <a:xfrm>
             <a:off x="839585" y="2044931"/>
-            <a:ext cx="10532226" cy="2000548"/>
+            <a:ext cx="10532226" cy="3770263"/>
           </a:xfrm>
           <a:prstGeom prst="rect">
             <a:avLst/>
@@ -7219,7 +7220,7 @@
             </a:pPr>
             <a:r>
               <a:rPr lang="en-US" sz="3100" dirty="0"/>
-              <a:t>What would JERRY do?</a:t>
+              <a:t>Forked and got to work</a:t>
             </a:r>
           </a:p>
           <a:p>
@@ -7229,7 +7230,7 @@
             </a:pPr>
             <a:r>
               <a:rPr lang="en-US" sz="3100" dirty="0"/>
-              <a:t>Does he get paid to do this?</a:t>
+              <a:t>The Pull Request</a:t>
             </a:r>
           </a:p>
           <a:p>
@@ -7238,9 +7239,42 @@
               <a:buChar char="•"/>
             </a:pPr>
             <a:r>
+              <a:rPr lang="en-US" sz="2800" dirty="0">
+                <a:hlinkClick r:id="rId2"/>
+              </a:rPr>
+              <a:t>https://github.com/Microsoft/UWPCommunityToolkit/pull/714</a:t>
+            </a:r>
+            <a:endParaRPr lang="en-US" sz="2800" dirty="0"/>
+          </a:p>
+          <a:p>
+            <a:pPr marL="457200" indent="-457200">
+              <a:buFont typeface="Arial" panose="020B0604020202020204" pitchFamily="34" charset="0"/>
+              <a:buChar char="•"/>
+            </a:pPr>
+            <a:r>
               <a:rPr lang="en-US" sz="3100" dirty="0"/>
-              <a:t>Very inspirational</a:t>
-            </a:r>
+              <a:t>More Updates</a:t>
+            </a:r>
+          </a:p>
+          <a:p>
+            <a:pPr marL="457200" indent="-457200">
+              <a:buFont typeface="Arial" panose="020B0604020202020204" pitchFamily="34" charset="0"/>
+              <a:buChar char="•"/>
+            </a:pPr>
+            <a:r>
+              <a:rPr lang="en-US" sz="2800" dirty="0">
+                <a:hlinkClick r:id="rId3"/>
+              </a:rPr>
+              <a:t>https://github.com/Microsoft/UWPCommunityToolkit/issues/727</a:t>
+            </a:r>
+            <a:endParaRPr lang="en-US" sz="2800" dirty="0"/>
+          </a:p>
+          <a:p>
+            <a:pPr marL="457200" indent="-457200">
+              <a:buFont typeface="Arial" panose="020B0604020202020204" pitchFamily="34" charset="0"/>
+              <a:buChar char="•"/>
+            </a:pPr>
+            <a:endParaRPr lang="en-US" sz="2800" dirty="0"/>
           </a:p>
           <a:p>
             <a:pPr marL="457200" indent="-457200">
@@ -7249,6 +7283,13 @@
             </a:pPr>
             <a:endParaRPr lang="en-US" sz="3100" dirty="0"/>
           </a:p>
+          <a:p>
+            <a:pPr marL="457200" indent="-457200">
+              <a:buFont typeface="Arial" panose="020B0604020202020204" pitchFamily="34" charset="0"/>
+              <a:buChar char="•"/>
+            </a:pPr>
+            <a:endParaRPr lang="en-US" sz="3100" dirty="0"/>
+          </a:p>
         </p:txBody>
       </p:sp>
       <p:sp>
@@ -7256,7 +7297,7 @@
           <p:cNvPr id="5" name="TextBox 4">
             <a:extLst>
               <a:ext uri="{FF2B5EF4-FFF2-40B4-BE49-F238E27FC236}">
-                <a16:creationId xmlns:a16="http://schemas.microsoft.com/office/drawing/2014/main" id="{3E361B44-F2F6-419E-AC00-4909D33D7715}"/>
+                <a16:creationId xmlns:a16="http://schemas.microsoft.com/office/drawing/2014/main" id="{5939B7F2-B094-4A61-A37A-BABADA1FF051}"/>
               </a:ext>
             </a:extLst>
           </p:cNvPr>
@@ -7296,7 +7337,7 @@
           <p:cNvPr id="6" name="Picture 5">
             <a:extLst>
               <a:ext uri="{FF2B5EF4-FFF2-40B4-BE49-F238E27FC236}">
-                <a16:creationId xmlns:a16="http://schemas.microsoft.com/office/drawing/2014/main" id="{3D15122E-478E-4AD4-ACAF-8C5DD4DEB7F2}"/>
+                <a16:creationId xmlns:a16="http://schemas.microsoft.com/office/drawing/2014/main" id="{8C485CEF-569C-4E99-A23A-7BBB2DA3B4D3}"/>
               </a:ext>
             </a:extLst>
           </p:cNvPr>
@@ -7306,7 +7347,7 @@
           <p:nvPr/>
         </p:nvPicPr>
         <p:blipFill>
-          <a:blip r:embed="rId2"/>
+          <a:blip r:embed="rId4"/>
           <a:stretch>
             <a:fillRect/>
           </a:stretch>
@@ -7324,7 +7365,7 @@
     </p:spTree>
     <p:extLst>
       <p:ext uri="{BB962C8B-B14F-4D97-AF65-F5344CB8AC3E}">
-        <p14:creationId xmlns:p14="http://schemas.microsoft.com/office/powerpoint/2010/main" val="4150981980"/>
+        <p14:creationId xmlns:p14="http://schemas.microsoft.com/office/powerpoint/2010/main" val="1637028176"/>
       </p:ext>
     </p:extLst>
   </p:cSld>
@@ -7374,7 +7415,7 @@
           <a:p>
             <a:r>
               <a:rPr lang="en-US" dirty="0"/>
-              <a:t>FOLLOW THE PROCESS (or don’t)</a:t>
+              <a:t>WAYS TO GIVE BACK</a:t>
             </a:r>
           </a:p>
         </p:txBody>
@@ -7393,8 +7434,8 @@
         </p:nvSpPr>
         <p:spPr>
           <a:xfrm>
-            <a:off x="839585" y="2044931"/>
-            <a:ext cx="10532226" cy="3770263"/>
+            <a:off x="829887" y="2077883"/>
+            <a:ext cx="10532226" cy="3908762"/>
           </a:xfrm>
           <a:prstGeom prst="rect">
             <a:avLst/>
@@ -7413,7 +7454,7 @@
             </a:pPr>
             <a:r>
               <a:rPr lang="en-US" sz="3100" dirty="0"/>
-              <a:t>Forked and got to work</a:t>
+              <a:t>Report bugs</a:t>
             </a:r>
           </a:p>
           <a:p>
@@ -7423,7 +7464,7 @@
             </a:pPr>
             <a:r>
               <a:rPr lang="en-US" sz="3100" dirty="0"/>
-              <a:t>The Pull Request</a:t>
+              <a:t>Feedback</a:t>
             </a:r>
           </a:p>
           <a:p>
@@ -7432,12 +7473,9 @@
               <a:buChar char="•"/>
             </a:pPr>
             <a:r>
-              <a:rPr lang="en-US" sz="2800" dirty="0">
-                <a:hlinkClick r:id="rId2"/>
-              </a:rPr>
-              <a:t>https://github.com/Microsoft/UWPCommunityToolkit/pull/714</a:t>
-            </a:r>
-            <a:endParaRPr lang="en-US" sz="2800" dirty="0"/>
+              <a:rPr lang="en-US" sz="3100" dirty="0"/>
+              <a:t>Mentor (at work or school)</a:t>
+            </a:r>
           </a:p>
           <a:p>
             <a:pPr marL="457200" indent="-457200">
@@ -7446,7 +7484,7 @@
             </a:pPr>
             <a:r>
               <a:rPr lang="en-US" sz="3100" dirty="0"/>
-              <a:t>More Updates</a:t>
+              <a:t>Talks (like this one)</a:t>
             </a:r>
           </a:p>
           <a:p>
@@ -7455,19 +7493,26 @@
               <a:buChar char="•"/>
             </a:pPr>
             <a:r>
-              <a:rPr lang="en-US" sz="2800" dirty="0">
-                <a:hlinkClick r:id="rId3"/>
+              <a:rPr lang="en-US" sz="3100" dirty="0"/>
+              <a:t>Blog		 </a:t>
+            </a:r>
+            <a:r>
+              <a:rPr lang="en-US" sz="3100" dirty="0">
+                <a:hlinkClick r:id="rId2"/>
               </a:rPr>
-              <a:t>https://github.com/Microsoft/UWPCommunityToolkit/issues/727</a:t>
-            </a:r>
-            <a:endParaRPr lang="en-US" sz="2800" dirty="0"/>
+              <a:t>https://spilledmilkcom.wordpress.com/</a:t>
+            </a:r>
+            <a:endParaRPr lang="en-US" sz="3100" dirty="0"/>
           </a:p>
           <a:p>
             <a:pPr marL="457200" indent="-457200">
               <a:buFont typeface="Arial" panose="020B0604020202020204" pitchFamily="34" charset="0"/>
               <a:buChar char="•"/>
             </a:pPr>
-            <a:endParaRPr lang="en-US" sz="2800" dirty="0"/>
+            <a:r>
+              <a:rPr lang="en-US" sz="3100" dirty="0"/>
+              <a:t>Free Stuff</a:t>
+            </a:r>
           </a:p>
           <a:p>
             <a:pPr marL="457200" indent="-457200">
@@ -7540,7 +7585,7 @@
           <p:nvPr/>
         </p:nvPicPr>
         <p:blipFill>
-          <a:blip r:embed="rId4"/>
+          <a:blip r:embed="rId3"/>
           <a:stretch>
             <a:fillRect/>
           </a:stretch>
@@ -7558,7 +7603,7 @@
     </p:spTree>
     <p:extLst>
       <p:ext uri="{BB962C8B-B14F-4D97-AF65-F5344CB8AC3E}">
-        <p14:creationId xmlns:p14="http://schemas.microsoft.com/office/powerpoint/2010/main" val="1637028176"/>
+        <p14:creationId xmlns:p14="http://schemas.microsoft.com/office/powerpoint/2010/main" val="1014307122"/>
       </p:ext>
     </p:extLst>
   </p:cSld>
@@ -7587,38 +7632,130 @@
       </p:grpSpPr>
       <p:sp>
         <p:nvSpPr>
-          <p:cNvPr id="2" name="Title 1">
+          <p:cNvPr id="2" name="Title 1"/>
+          <p:cNvSpPr>
+            <a:spLocks noGrp="1"/>
+          </p:cNvSpPr>
+          <p:nvPr>
+            <p:ph type="title"/>
+          </p:nvPr>
+        </p:nvSpPr>
+        <p:spPr/>
+        <p:txBody>
+          <a:bodyPr/>
+          <a:lstStyle/>
+          <a:p>
+            <a:r>
+              <a:rPr lang="en-US" dirty="0"/>
+              <a:t>CREATOR OF THINGS YOU DON’T KNOW ABOUT</a:t>
+            </a:r>
+          </a:p>
+        </p:txBody>
+      </p:sp>
+      <p:sp>
+        <p:nvSpPr>
+          <p:cNvPr id="4" name="TextBox 3"/>
+          <p:cNvSpPr txBox="1"/>
+          <p:nvPr/>
+        </p:nvSpPr>
+        <p:spPr>
+          <a:xfrm>
+            <a:off x="839585" y="2044931"/>
+            <a:ext cx="10532226" cy="2554545"/>
+          </a:xfrm>
+          <a:prstGeom prst="rect">
+            <a:avLst/>
+          </a:prstGeom>
+          <a:noFill/>
+        </p:spPr>
+        <p:txBody>
+          <a:bodyPr wrap="square" rtlCol="0">
+            <a:spAutoFit/>
+          </a:bodyPr>
+          <a:lstStyle/>
+          <a:p>
+            <a:pPr marL="457200" indent="-457200">
+              <a:buFont typeface="Arial" panose="020B0604020202020204" pitchFamily="34" charset="0"/>
+              <a:buChar char="•"/>
+            </a:pPr>
+            <a:r>
+              <a:rPr lang="en-US" sz="3200" dirty="0"/>
+              <a:t>Spilled Milk / </a:t>
+            </a:r>
+            <a:r>
+              <a:rPr lang="en-US" sz="3200" dirty="0" err="1"/>
+              <a:t>CiCi</a:t>
+            </a:r>
+            <a:r>
+              <a:rPr lang="en-US" sz="3200" dirty="0"/>
+              <a:t> (Comic Book &amp; Web)</a:t>
+            </a:r>
+          </a:p>
+          <a:p>
+            <a:pPr marL="457200" indent="-457200">
+              <a:buFont typeface="Arial" panose="020B0604020202020204" pitchFamily="34" charset="0"/>
+              <a:buChar char="•"/>
+            </a:pPr>
+            <a:r>
+              <a:rPr lang="en-US" sz="3200" dirty="0"/>
+              <a:t>     Idiot Driver (Windows Phone 7, 8.1, 10, UWP)</a:t>
+            </a:r>
+          </a:p>
+          <a:p>
+            <a:pPr marL="457200" indent="-457200">
+              <a:buFont typeface="Arial" panose="020B0604020202020204" pitchFamily="34" charset="0"/>
+              <a:buChar char="•"/>
+            </a:pPr>
+            <a:r>
+              <a:rPr lang="en-US" sz="3200" dirty="0"/>
+              <a:t>            Check Out My Stuff (Web)</a:t>
+            </a:r>
+          </a:p>
+          <a:p>
+            <a:pPr marL="457200" indent="-457200">
+              <a:buFont typeface="Arial" panose="020B0604020202020204" pitchFamily="34" charset="0"/>
+              <a:buChar char="•"/>
+            </a:pPr>
+            <a:r>
+              <a:rPr lang="en-US" sz="3200" dirty="0" err="1"/>
+              <a:t>Intergrator</a:t>
+            </a:r>
+            <a:r>
+              <a:rPr lang="en-US" sz="3200" dirty="0"/>
+              <a:t> (</a:t>
+            </a:r>
+            <a:r>
+              <a:rPr lang="en-US" sz="3200" dirty="0" err="1"/>
+              <a:t>Integraph</a:t>
+            </a:r>
+            <a:r>
+              <a:rPr lang="en-US" sz="3200" dirty="0"/>
+              <a:t>)  </a:t>
+            </a:r>
+            <a:r>
+              <a:rPr lang="en-US" sz="3200" dirty="0" err="1"/>
+              <a:t>Visix</a:t>
+            </a:r>
+            <a:r>
+              <a:rPr lang="en-US" sz="3200" dirty="0"/>
+              <a:t>? (circa 1990)</a:t>
+            </a:r>
+          </a:p>
+          <a:p>
+            <a:pPr marL="457200" indent="-457200">
+              <a:buFont typeface="Arial" panose="020B0604020202020204" pitchFamily="34" charset="0"/>
+              <a:buChar char="•"/>
+            </a:pPr>
+            <a:endParaRPr lang="en-US" sz="3200" dirty="0"/>
+          </a:p>
+        </p:txBody>
+      </p:sp>
+      <p:sp>
+        <p:nvSpPr>
+          <p:cNvPr id="5" name="TextBox 4">
             <a:extLst>
               <a:ext uri="{FF2B5EF4-FFF2-40B4-BE49-F238E27FC236}">
-                <a16:creationId xmlns:a16="http://schemas.microsoft.com/office/drawing/2014/main" id="{15897EB4-928B-499B-AE96-0FB6071C79F6}"/>
-              </a:ext>
-            </a:extLst>
-          </p:cNvPr>
-          <p:cNvSpPr>
-            <a:spLocks noGrp="1"/>
-          </p:cNvSpPr>
-          <p:nvPr>
-            <p:ph type="title"/>
-          </p:nvPr>
-        </p:nvSpPr>
-        <p:spPr/>
-        <p:txBody>
-          <a:bodyPr/>
-          <a:lstStyle/>
-          <a:p>
-            <a:r>
-              <a:rPr lang="en-US" dirty="0"/>
-              <a:t>WAYS TO GIVE BACK</a:t>
-            </a:r>
-          </a:p>
-        </p:txBody>
-      </p:sp>
-      <p:sp>
-        <p:nvSpPr>
-          <p:cNvPr id="4" name="TextBox 3">
-            <a:extLst>
-              <a:ext uri="{FF2B5EF4-FFF2-40B4-BE49-F238E27FC236}">
-                <a16:creationId xmlns:a16="http://schemas.microsoft.com/office/drawing/2014/main" id="{D8209725-78A1-4B7B-BB69-4318C7DB1317}"/>
+                <a16:creationId xmlns:a16="http://schemas.microsoft.com/office/drawing/2014/main" id="{3BD8A721-A00C-4669-8C1A-09CB85A64CB3}"/>
               </a:ext>
             </a:extLst>
           </p:cNvPr>
@@ -7627,130 +7764,6 @@
         </p:nvSpPr>
         <p:spPr>
           <a:xfrm>
-            <a:off x="829887" y="2077883"/>
-            <a:ext cx="10532226" cy="3908762"/>
-          </a:xfrm>
-          <a:prstGeom prst="rect">
-            <a:avLst/>
-          </a:prstGeom>
-          <a:noFill/>
-        </p:spPr>
-        <p:txBody>
-          <a:bodyPr wrap="square" rtlCol="0">
-            <a:spAutoFit/>
-          </a:bodyPr>
-          <a:lstStyle/>
-          <a:p>
-            <a:pPr marL="457200" indent="-457200">
-              <a:buFont typeface="Arial" panose="020B0604020202020204" pitchFamily="34" charset="0"/>
-              <a:buChar char="•"/>
-            </a:pPr>
-            <a:r>
-              <a:rPr lang="en-US" sz="3100" dirty="0"/>
-              <a:t>Report bugs</a:t>
-            </a:r>
-          </a:p>
-          <a:p>
-            <a:pPr marL="457200" indent="-457200">
-              <a:buFont typeface="Arial" panose="020B0604020202020204" pitchFamily="34" charset="0"/>
-              <a:buChar char="•"/>
-            </a:pPr>
-            <a:r>
-              <a:rPr lang="en-US" sz="3100" dirty="0"/>
-              <a:t>Feedback</a:t>
-            </a:r>
-          </a:p>
-          <a:p>
-            <a:pPr marL="457200" indent="-457200">
-              <a:buFont typeface="Arial" panose="020B0604020202020204" pitchFamily="34" charset="0"/>
-              <a:buChar char="•"/>
-            </a:pPr>
-            <a:r>
-              <a:rPr lang="en-US" sz="3100" dirty="0"/>
-              <a:t>Mentor (at work or school)</a:t>
-            </a:r>
-          </a:p>
-          <a:p>
-            <a:pPr marL="457200" indent="-457200">
-              <a:buFont typeface="Arial" panose="020B0604020202020204" pitchFamily="34" charset="0"/>
-              <a:buChar char="•"/>
-            </a:pPr>
-            <a:r>
-              <a:rPr lang="en-US" sz="3100" dirty="0"/>
-              <a:t>Talks (like this one</a:t>
-            </a:r>
-            <a:r>
-              <a:rPr lang="en-US" sz="3100" dirty="0" smtClean="0"/>
-              <a:t>)</a:t>
-            </a:r>
-          </a:p>
-          <a:p>
-            <a:pPr marL="457200" indent="-457200">
-              <a:buFont typeface="Arial" panose="020B0604020202020204" pitchFamily="34" charset="0"/>
-              <a:buChar char="•"/>
-            </a:pPr>
-            <a:r>
-              <a:rPr lang="en-US" sz="3100" dirty="0" smtClean="0"/>
-              <a:t>Blog		 </a:t>
-            </a:r>
-            <a:r>
-              <a:rPr lang="en-US" sz="3100" dirty="0">
-                <a:hlinkClick r:id="rId2"/>
-              </a:rPr>
-              <a:t>https://</a:t>
-            </a:r>
-            <a:r>
-              <a:rPr lang="en-US" sz="3100" dirty="0" smtClean="0">
-                <a:hlinkClick r:id="rId2"/>
-              </a:rPr>
-              <a:t>spilledmilkcom.wordpress.com/</a:t>
-            </a:r>
-            <a:endParaRPr lang="en-US" sz="3100" dirty="0"/>
-          </a:p>
-          <a:p>
-            <a:pPr marL="457200" indent="-457200">
-              <a:buFont typeface="Arial" panose="020B0604020202020204" pitchFamily="34" charset="0"/>
-              <a:buChar char="•"/>
-            </a:pPr>
-            <a:r>
-              <a:rPr lang="en-US" sz="3100" dirty="0" smtClean="0"/>
-              <a:t>Free </a:t>
-            </a:r>
-            <a:r>
-              <a:rPr lang="en-US" sz="3100" dirty="0"/>
-              <a:t>Stuff</a:t>
-            </a:r>
-          </a:p>
-          <a:p>
-            <a:pPr marL="457200" indent="-457200">
-              <a:buFont typeface="Arial" panose="020B0604020202020204" pitchFamily="34" charset="0"/>
-              <a:buChar char="•"/>
-            </a:pPr>
-            <a:endParaRPr lang="en-US" sz="3100" dirty="0"/>
-          </a:p>
-          <a:p>
-            <a:pPr marL="457200" indent="-457200">
-              <a:buFont typeface="Arial" panose="020B0604020202020204" pitchFamily="34" charset="0"/>
-              <a:buChar char="•"/>
-            </a:pPr>
-            <a:endParaRPr lang="en-US" sz="3100" dirty="0"/>
-          </a:p>
-        </p:txBody>
-      </p:sp>
-      <p:sp>
-        <p:nvSpPr>
-          <p:cNvPr id="5" name="TextBox 4">
-            <a:extLst>
-              <a:ext uri="{FF2B5EF4-FFF2-40B4-BE49-F238E27FC236}">
-                <a16:creationId xmlns:a16="http://schemas.microsoft.com/office/drawing/2014/main" id="{5939B7F2-B094-4A61-A37A-BABADA1FF051}"/>
-              </a:ext>
-            </a:extLst>
-          </p:cNvPr>
-          <p:cNvSpPr txBox="1"/>
-          <p:nvPr/>
-        </p:nvSpPr>
-        <p:spPr>
-          <a:xfrm>
             <a:off x="518985" y="6334898"/>
             <a:ext cx="1933543" cy="369332"/>
           </a:xfrm>
@@ -7782,7 +7795,37 @@
           <p:cNvPr id="6" name="Picture 5">
             <a:extLst>
               <a:ext uri="{FF2B5EF4-FFF2-40B4-BE49-F238E27FC236}">
-                <a16:creationId xmlns:a16="http://schemas.microsoft.com/office/drawing/2014/main" id="{8C485CEF-569C-4E99-A23A-7BBB2DA3B4D3}"/>
+                <a16:creationId xmlns:a16="http://schemas.microsoft.com/office/drawing/2014/main" id="{FE3DDF5B-0BC3-46B7-82C7-2729B7940BEA}"/>
+              </a:ext>
+            </a:extLst>
+          </p:cNvPr>
+          <p:cNvPicPr>
+            <a:picLocks noChangeAspect="1"/>
+          </p:cNvPicPr>
+          <p:nvPr/>
+        </p:nvPicPr>
+        <p:blipFill>
+          <a:blip r:embed="rId2"/>
+          <a:stretch>
+            <a:fillRect/>
+          </a:stretch>
+        </p:blipFill>
+        <p:spPr>
+          <a:xfrm>
+            <a:off x="81934" y="6318422"/>
+            <a:ext cx="437051" cy="301415"/>
+          </a:xfrm>
+          <a:prstGeom prst="rect">
+            <a:avLst/>
+          </a:prstGeom>
+        </p:spPr>
+      </p:pic>
+      <p:pic>
+        <p:nvPicPr>
+          <p:cNvPr id="7" name="Picture 6">
+            <a:extLst>
+              <a:ext uri="{FF2B5EF4-FFF2-40B4-BE49-F238E27FC236}">
+                <a16:creationId xmlns:a16="http://schemas.microsoft.com/office/drawing/2014/main" id="{E8CC1C91-0C35-4678-88A8-B3ABC9BCDBE4}"/>
               </a:ext>
             </a:extLst>
           </p:cNvPr>
@@ -7799,8 +7842,74 @@
         </p:blipFill>
         <p:spPr>
           <a:xfrm>
-            <a:off x="81934" y="6318422"/>
-            <a:ext cx="437051" cy="301415"/>
+            <a:off x="9990467" y="2037901"/>
+            <a:ext cx="844312" cy="886528"/>
+          </a:xfrm>
+          <a:prstGeom prst="rect">
+            <a:avLst/>
+          </a:prstGeom>
+        </p:spPr>
+      </p:pic>
+      <p:pic>
+        <p:nvPicPr>
+          <p:cNvPr id="8" name="Picture 7">
+            <a:extLst>
+              <a:ext uri="{FF2B5EF4-FFF2-40B4-BE49-F238E27FC236}">
+                <a16:creationId xmlns:a16="http://schemas.microsoft.com/office/drawing/2014/main" id="{F5FBC0A0-53BC-4C36-8691-F100F38EE567}"/>
+              </a:ext>
+            </a:extLst>
+          </p:cNvPr>
+          <p:cNvPicPr>
+            <a:picLocks noChangeAspect="1"/>
+          </p:cNvPicPr>
+          <p:nvPr/>
+        </p:nvPicPr>
+        <p:blipFill>
+          <a:blip r:embed="rId4">
+            <a:extLst>
+              <a:ext uri="{28A0092B-C50C-407E-A947-70E740481C1C}">
+                <a14:useLocalDpi xmlns:a14="http://schemas.microsoft.com/office/drawing/2010/main" val="0"/>
+              </a:ext>
+            </a:extLst>
+          </a:blip>
+          <a:stretch>
+            <a:fillRect/>
+          </a:stretch>
+        </p:blipFill>
+        <p:spPr>
+          <a:xfrm>
+            <a:off x="1230735" y="2615441"/>
+            <a:ext cx="510041" cy="510041"/>
+          </a:xfrm>
+          <a:prstGeom prst="rect">
+            <a:avLst/>
+          </a:prstGeom>
+        </p:spPr>
+      </p:pic>
+      <p:pic>
+        <p:nvPicPr>
+          <p:cNvPr id="9" name="Picture 8">
+            <a:extLst>
+              <a:ext uri="{FF2B5EF4-FFF2-40B4-BE49-F238E27FC236}">
+                <a16:creationId xmlns:a16="http://schemas.microsoft.com/office/drawing/2014/main" id="{D3260848-9409-45C9-A964-5FF30D2F8408}"/>
+              </a:ext>
+            </a:extLst>
+          </p:cNvPr>
+          <p:cNvPicPr>
+            <a:picLocks noChangeAspect="1"/>
+          </p:cNvPicPr>
+          <p:nvPr/>
+        </p:nvPicPr>
+        <p:blipFill>
+          <a:blip r:embed="rId5"/>
+          <a:stretch>
+            <a:fillRect/>
+          </a:stretch>
+        </p:blipFill>
+        <p:spPr>
+          <a:xfrm>
+            <a:off x="2024775" y="3058078"/>
+            <a:ext cx="583030" cy="583030"/>
           </a:xfrm>
           <a:prstGeom prst="rect">
             <a:avLst/>
@@ -7810,7 +7919,7 @@
     </p:spTree>
     <p:extLst>
       <p:ext uri="{BB962C8B-B14F-4D97-AF65-F5344CB8AC3E}">
-        <p14:creationId xmlns:p14="http://schemas.microsoft.com/office/powerpoint/2010/main" val="1014307122"/>
+        <p14:creationId xmlns:p14="http://schemas.microsoft.com/office/powerpoint/2010/main" val="2493795457"/>
       </p:ext>
     </p:extLst>
   </p:cSld>
@@ -7839,103 +7948,38 @@
       </p:grpSpPr>
       <p:sp>
         <p:nvSpPr>
-          <p:cNvPr id="2" name="Title 1"/>
-          <p:cNvSpPr>
-            <a:spLocks noGrp="1"/>
-          </p:cNvSpPr>
-          <p:nvPr>
-            <p:ph type="title"/>
-          </p:nvPr>
-        </p:nvSpPr>
-        <p:spPr/>
-        <p:txBody>
-          <a:bodyPr/>
-          <a:lstStyle/>
-          <a:p>
-            <a:r>
-              <a:rPr lang="en-US" dirty="0" smtClean="0"/>
-              <a:t>CREATOR OF THINGS YOU DON’T KNOW ABOUT</a:t>
-            </a:r>
-            <a:endParaRPr lang="en-US" dirty="0"/>
-          </a:p>
-        </p:txBody>
-      </p:sp>
-      <p:sp>
-        <p:nvSpPr>
-          <p:cNvPr id="4" name="TextBox 3"/>
-          <p:cNvSpPr txBox="1"/>
-          <p:nvPr/>
-        </p:nvSpPr>
-        <p:spPr>
-          <a:xfrm>
-            <a:off x="839585" y="2044931"/>
-            <a:ext cx="10532226" cy="2062103"/>
-          </a:xfrm>
-          <a:prstGeom prst="rect">
-            <a:avLst/>
-          </a:prstGeom>
-          <a:noFill/>
-        </p:spPr>
-        <p:txBody>
-          <a:bodyPr wrap="square" rtlCol="0">
-            <a:spAutoFit/>
-          </a:bodyPr>
-          <a:lstStyle/>
-          <a:p>
-            <a:pPr marL="457200" indent="-457200">
-              <a:buFont typeface="Arial" panose="020B0604020202020204" pitchFamily="34" charset="0"/>
-              <a:buChar char="•"/>
-            </a:pPr>
-            <a:r>
-              <a:rPr lang="en-US" sz="3200" dirty="0" smtClean="0"/>
-              <a:t>Spilled Milk / </a:t>
-            </a:r>
-            <a:r>
-              <a:rPr lang="en-US" sz="3200" dirty="0" err="1" smtClean="0"/>
-              <a:t>CiCi</a:t>
-            </a:r>
-            <a:r>
-              <a:rPr lang="en-US" sz="3200" dirty="0" smtClean="0"/>
-              <a:t> (Comic Book &amp; Web)</a:t>
-            </a:r>
-            <a:endParaRPr lang="en-US" sz="3200" dirty="0"/>
-          </a:p>
-          <a:p>
-            <a:pPr marL="457200" indent="-457200">
-              <a:buFont typeface="Arial" panose="020B0604020202020204" pitchFamily="34" charset="0"/>
-              <a:buChar char="•"/>
-            </a:pPr>
-            <a:r>
-              <a:rPr lang="en-US" sz="3200" dirty="0" smtClean="0"/>
-              <a:t>Idiot Driver (Windows Phone 7, 8.1, 10, UWP)</a:t>
-            </a:r>
-          </a:p>
-          <a:p>
-            <a:pPr marL="457200" indent="-457200">
-              <a:buFont typeface="Arial" panose="020B0604020202020204" pitchFamily="34" charset="0"/>
-              <a:buChar char="•"/>
-            </a:pPr>
-            <a:r>
-              <a:rPr lang="en-US" sz="3200" dirty="0" smtClean="0"/>
-              <a:t>Check Out My Stuff (Web)</a:t>
-            </a:r>
-            <a:endParaRPr lang="en-US" sz="3200" dirty="0"/>
-          </a:p>
-          <a:p>
-            <a:pPr marL="457200" indent="-457200">
-              <a:buFont typeface="Arial" panose="020B0604020202020204" pitchFamily="34" charset="0"/>
-              <a:buChar char="•"/>
-            </a:pPr>
-            <a:endParaRPr lang="en-US" sz="3200" dirty="0"/>
-          </a:p>
-        </p:txBody>
-      </p:sp>
-      <p:sp>
-        <p:nvSpPr>
-          <p:cNvPr id="5" name="TextBox 4">
+          <p:cNvPr id="2" name="Title 1">
             <a:extLst>
               <a:ext uri="{FF2B5EF4-FFF2-40B4-BE49-F238E27FC236}">
-                <a16:creationId xmlns:a16="http://schemas.microsoft.com/office/drawing/2014/main" id="{3BD8A721-A00C-4669-8C1A-09CB85A64CB3}"/>
+                <a16:creationId xmlns:a16="http://schemas.microsoft.com/office/drawing/2014/main" id="{15897EB4-928B-499B-AE96-0FB6071C79F6}"/>
+              </a:ext>
+            </a:extLst>
+          </p:cNvPr>
+          <p:cNvSpPr>
+            <a:spLocks noGrp="1"/>
+          </p:cNvSpPr>
+          <p:nvPr>
+            <p:ph type="title"/>
+          </p:nvPr>
+        </p:nvSpPr>
+        <p:spPr/>
+        <p:txBody>
+          <a:bodyPr/>
+          <a:lstStyle/>
+          <a:p>
+            <a:r>
+              <a:rPr lang="en-US" dirty="0"/>
+              <a:t>Benefit career?</a:t>
+            </a:r>
+          </a:p>
+        </p:txBody>
+      </p:sp>
+      <p:sp>
+        <p:nvSpPr>
+          <p:cNvPr id="4" name="TextBox 3">
+            <a:extLst>
+              <a:ext uri="{FF2B5EF4-FFF2-40B4-BE49-F238E27FC236}">
+                <a16:creationId xmlns:a16="http://schemas.microsoft.com/office/drawing/2014/main" id="{D8209725-78A1-4B7B-BB69-4318C7DB1317}"/>
               </a:ext>
             </a:extLst>
           </p:cNvPr>
@@ -7944,6 +7988,102 @@
         </p:nvSpPr>
         <p:spPr>
           <a:xfrm>
+            <a:off x="829887" y="2077883"/>
+            <a:ext cx="10532226" cy="3431709"/>
+          </a:xfrm>
+          <a:prstGeom prst="rect">
+            <a:avLst/>
+          </a:prstGeom>
+          <a:noFill/>
+        </p:spPr>
+        <p:txBody>
+          <a:bodyPr wrap="square" rtlCol="0">
+            <a:spAutoFit/>
+          </a:bodyPr>
+          <a:lstStyle/>
+          <a:p>
+            <a:pPr marL="457200" indent="-457200">
+              <a:buFont typeface="Arial" panose="020B0604020202020204" pitchFamily="34" charset="0"/>
+              <a:buChar char="•"/>
+            </a:pPr>
+            <a:r>
+              <a:rPr lang="en-US" sz="3100" dirty="0"/>
+              <a:t>At the very least get a GitHub (it’s FREE)</a:t>
+            </a:r>
+          </a:p>
+          <a:p>
+            <a:pPr marL="914400" lvl="1" indent="-457200">
+              <a:buFont typeface="Arial" panose="020B0604020202020204" pitchFamily="34" charset="0"/>
+              <a:buChar char="•"/>
+            </a:pPr>
+            <a:r>
+              <a:rPr lang="en-US" sz="3100" dirty="0"/>
+              <a:t>Show off your code?</a:t>
+            </a:r>
+          </a:p>
+          <a:p>
+            <a:pPr marL="914400" lvl="1" indent="-457200">
+              <a:buFont typeface="Arial" panose="020B0604020202020204" pitchFamily="34" charset="0"/>
+              <a:buChar char="•"/>
+            </a:pPr>
+            <a:r>
+              <a:rPr lang="en-US" sz="3100" dirty="0"/>
+              <a:t>Or JUST storage?</a:t>
+            </a:r>
+          </a:p>
+          <a:p>
+            <a:pPr marL="457200" indent="-457200">
+              <a:buFont typeface="Arial" panose="020B0604020202020204" pitchFamily="34" charset="0"/>
+              <a:buChar char="•"/>
+            </a:pPr>
+            <a:r>
+              <a:rPr lang="en-US" sz="3100" dirty="0"/>
+              <a:t>Contributions a good mention on resume?</a:t>
+            </a:r>
+          </a:p>
+          <a:p>
+            <a:pPr marL="457200" indent="-457200">
+              <a:buFont typeface="Arial" panose="020B0604020202020204" pitchFamily="34" charset="0"/>
+              <a:buChar char="•"/>
+            </a:pPr>
+            <a:r>
+              <a:rPr lang="en-US" sz="3100" dirty="0"/>
+              <a:t>How do you look at new technology?</a:t>
+            </a:r>
+          </a:p>
+          <a:p>
+            <a:pPr marL="457200" indent="-457200">
+              <a:buFont typeface="Arial" panose="020B0604020202020204" pitchFamily="34" charset="0"/>
+              <a:buChar char="•"/>
+            </a:pPr>
+            <a:r>
+              <a:rPr lang="en-US" sz="3100" dirty="0"/>
+              <a:t>Networking is always good.</a:t>
+            </a:r>
+          </a:p>
+          <a:p>
+            <a:pPr marL="457200" indent="-457200">
+              <a:buFont typeface="Arial" panose="020B0604020202020204" pitchFamily="34" charset="0"/>
+              <a:buChar char="•"/>
+            </a:pPr>
+            <a:endParaRPr lang="en-US" sz="3100" dirty="0"/>
+          </a:p>
+        </p:txBody>
+      </p:sp>
+      <p:sp>
+        <p:nvSpPr>
+          <p:cNvPr id="5" name="TextBox 4">
+            <a:extLst>
+              <a:ext uri="{FF2B5EF4-FFF2-40B4-BE49-F238E27FC236}">
+                <a16:creationId xmlns:a16="http://schemas.microsoft.com/office/drawing/2014/main" id="{5939B7F2-B094-4A61-A37A-BABADA1FF051}"/>
+              </a:ext>
+            </a:extLst>
+          </p:cNvPr>
+          <p:cNvSpPr txBox="1"/>
+          <p:nvPr/>
+        </p:nvSpPr>
+        <p:spPr>
+          <a:xfrm>
             <a:off x="518985" y="6334898"/>
             <a:ext cx="1933543" cy="369332"/>
           </a:xfrm>
@@ -7975,7 +8115,7 @@
           <p:cNvPr id="6" name="Picture 5">
             <a:extLst>
               <a:ext uri="{FF2B5EF4-FFF2-40B4-BE49-F238E27FC236}">
-                <a16:creationId xmlns:a16="http://schemas.microsoft.com/office/drawing/2014/main" id="{FE3DDF5B-0BC3-46B7-82C7-2729B7940BEA}"/>
+                <a16:creationId xmlns:a16="http://schemas.microsoft.com/office/drawing/2014/main" id="{8C485CEF-569C-4E99-A23A-7BBB2DA3B4D3}"/>
               </a:ext>
             </a:extLst>
           </p:cNvPr>
@@ -8003,7 +8143,7 @@
     </p:spTree>
     <p:extLst>
       <p:ext uri="{BB962C8B-B14F-4D97-AF65-F5344CB8AC3E}">
-        <p14:creationId xmlns:p14="http://schemas.microsoft.com/office/powerpoint/2010/main" val="2493795457"/>
+        <p14:creationId xmlns:p14="http://schemas.microsoft.com/office/powerpoint/2010/main" val="2303047754"/>
       </p:ext>
     </p:extLst>
   </p:cSld>
@@ -8052,14 +8192,9 @@
           <a:lstStyle/>
           <a:p>
             <a:r>
-              <a:rPr lang="en-US" dirty="0" smtClean="0"/>
-              <a:t>Benefit career</a:t>
-            </a:r>
-            <a:r>
-              <a:rPr lang="en-US" dirty="0" smtClean="0"/>
-              <a:t>?</a:t>
-            </a:r>
-            <a:endParaRPr lang="en-US" dirty="0"/>
+              <a:rPr lang="en-US" dirty="0"/>
+              <a:t>WWJD?</a:t>
+            </a:r>
           </a:p>
         </p:txBody>
       </p:sp>
@@ -8077,8 +8212,8 @@
         </p:nvSpPr>
         <p:spPr>
           <a:xfrm>
-            <a:off x="829887" y="2077883"/>
-            <a:ext cx="10532226" cy="2000548"/>
+            <a:off x="839585" y="2044931"/>
+            <a:ext cx="10532226" cy="3431709"/>
           </a:xfrm>
           <a:prstGeom prst="rect">
             <a:avLst/>
@@ -8096,8 +8231,8 @@
               <a:buChar char="•"/>
             </a:pPr>
             <a:r>
-              <a:rPr lang="en-US" sz="3100" dirty="0" smtClean="0"/>
-              <a:t>At the very least get a GitHub (it’s FREE)</a:t>
+              <a:rPr lang="en-US" sz="3100" dirty="0"/>
+              <a:t>What would JERRY do?</a:t>
             </a:r>
           </a:p>
           <a:p>
@@ -8106,8 +8241,8 @@
               <a:buChar char="•"/>
             </a:pPr>
             <a:r>
-              <a:rPr lang="en-US" sz="3100" dirty="0" smtClean="0"/>
-              <a:t>Contributions a good mention on resume?</a:t>
+              <a:rPr lang="en-US" sz="3100" dirty="0"/>
+              <a:t>Jerry knows cool stuff.</a:t>
             </a:r>
           </a:p>
           <a:p>
@@ -8116,10 +8251,29 @@
               <a:buChar char="•"/>
             </a:pPr>
             <a:r>
-              <a:rPr lang="en-US" sz="3100" dirty="0" smtClean="0"/>
-              <a:t>Networking is always good.</a:t>
-            </a:r>
-            <a:endParaRPr lang="en-US" sz="3100" dirty="0"/>
+              <a:rPr lang="en-US" sz="3100" dirty="0"/>
+              <a:t>Does he get paid to do this? (probably does)</a:t>
+            </a:r>
+          </a:p>
+          <a:p>
+            <a:pPr marL="457200" indent="-457200">
+              <a:buFont typeface="Arial" panose="020B0604020202020204" pitchFamily="34" charset="0"/>
+              <a:buChar char="•"/>
+            </a:pPr>
+            <a:r>
+              <a:rPr lang="en-US" sz="3100" dirty="0"/>
+              <a:t>Very inspirational</a:t>
+            </a:r>
+          </a:p>
+          <a:p>
+            <a:pPr marL="457200" indent="-457200">
+              <a:buFont typeface="Arial" panose="020B0604020202020204" pitchFamily="34" charset="0"/>
+              <a:buChar char="•"/>
+            </a:pPr>
+            <a:r>
+              <a:rPr lang="en-US" sz="3100" dirty="0"/>
+              <a:t>Had to give a shout out (but don’t chant cause it’s not the Jerry Springer show)</a:t>
+            </a:r>
           </a:p>
           <a:p>
             <a:pPr marL="457200" indent="-457200">
@@ -8135,7 +8289,7 @@
           <p:cNvPr id="5" name="TextBox 4">
             <a:extLst>
               <a:ext uri="{FF2B5EF4-FFF2-40B4-BE49-F238E27FC236}">
-                <a16:creationId xmlns:a16="http://schemas.microsoft.com/office/drawing/2014/main" id="{5939B7F2-B094-4A61-A37A-BABADA1FF051}"/>
+                <a16:creationId xmlns:a16="http://schemas.microsoft.com/office/drawing/2014/main" id="{3E361B44-F2F6-419E-AC00-4909D33D7715}"/>
               </a:ext>
             </a:extLst>
           </p:cNvPr>
@@ -8175,7 +8329,7 @@
           <p:cNvPr id="6" name="Picture 5">
             <a:extLst>
               <a:ext uri="{FF2B5EF4-FFF2-40B4-BE49-F238E27FC236}">
-                <a16:creationId xmlns:a16="http://schemas.microsoft.com/office/drawing/2014/main" id="{8C485CEF-569C-4E99-A23A-7BBB2DA3B4D3}"/>
+                <a16:creationId xmlns:a16="http://schemas.microsoft.com/office/drawing/2014/main" id="{3D15122E-478E-4AD4-ACAF-8C5DD4DEB7F2}"/>
               </a:ext>
             </a:extLst>
           </p:cNvPr>
@@ -8203,7 +8357,7 @@
     </p:spTree>
     <p:extLst>
       <p:ext uri="{BB962C8B-B14F-4D97-AF65-F5344CB8AC3E}">
-        <p14:creationId xmlns:p14="http://schemas.microsoft.com/office/powerpoint/2010/main" val="2303047754"/>
+        <p14:creationId xmlns:p14="http://schemas.microsoft.com/office/powerpoint/2010/main" val="3720415617"/>
       </p:ext>
     </p:extLst>
   </p:cSld>
@@ -8253,7 +8407,7 @@
           <a:p>
             <a:r>
               <a:rPr lang="en-US" dirty="0"/>
-              <a:t>WHAT WOULD YOU DO?</a:t>
+              <a:t>Shout outs</a:t>
             </a:r>
           </a:p>
         </p:txBody>
@@ -8292,7 +8446,23 @@
             </a:pPr>
             <a:r>
               <a:rPr lang="en-US" sz="3100" dirty="0"/>
-              <a:t>Poll the audience</a:t>
+              <a:t>@</a:t>
+            </a:r>
+            <a:r>
+              <a:rPr lang="en-US" sz="3100" dirty="0" err="1"/>
+              <a:t>RockyMtnRajah</a:t>
+            </a:r>
+            <a:r>
+              <a:rPr lang="en-US" sz="3100" dirty="0"/>
+              <a:t> </a:t>
+            </a:r>
+            <a:r>
+              <a:rPr lang="en-US" sz="3100" u="sng" dirty="0"/>
+              <a:t>Raj Rao </a:t>
+            </a:r>
+            <a:r>
+              <a:rPr lang="en-US" sz="3100" dirty="0"/>
+              <a:t>– COMS bug reports</a:t>
             </a:r>
           </a:p>
           <a:p>
@@ -8302,18 +8472,38 @@
             </a:pPr>
             <a:r>
               <a:rPr lang="en-US" sz="3100" dirty="0"/>
-              <a:t>It’s not me, it’s YOU!</a:t>
-            </a:r>
+              <a:t>@</a:t>
+            </a:r>
+            <a:r>
+              <a:rPr lang="en-US" sz="3100" dirty="0" err="1"/>
+              <a:t>nerdguru</a:t>
+            </a:r>
+            <a:r>
+              <a:rPr lang="en-US" sz="3100" dirty="0"/>
+              <a:t> </a:t>
+            </a:r>
+            <a:r>
+              <a:rPr lang="en-US" sz="3100" u="sng" dirty="0"/>
+              <a:t>Pete Johnson </a:t>
+            </a:r>
+            <a:r>
+              <a:rPr lang="en-US" sz="3100" dirty="0"/>
+              <a:t>- </a:t>
+            </a:r>
+            <a:r>
+              <a:rPr lang="en-US" sz="3100" dirty="0">
+                <a:hlinkClick r:id="rId2"/>
+              </a:rPr>
+              <a:t>http://analyzer.fmlnerd.com/</a:t>
+            </a:r>
+            <a:endParaRPr lang="en-US" sz="3100" dirty="0"/>
           </a:p>
           <a:p>
             <a:pPr marL="457200" indent="-457200">
               <a:buFont typeface="Arial" panose="020B0604020202020204" pitchFamily="34" charset="0"/>
               <a:buChar char="•"/>
             </a:pPr>
-            <a:r>
-              <a:rPr lang="en-US" sz="3100" dirty="0"/>
-              <a:t>Are you like me?</a:t>
-            </a:r>
+            <a:endParaRPr lang="en-US" sz="3100" dirty="0"/>
           </a:p>
           <a:p>
             <a:pPr marL="457200" indent="-457200">
@@ -8321,12 +8511,8 @@
               <a:buChar char="•"/>
             </a:pPr>
             <a:r>
-              <a:rPr lang="en-US" sz="3100" dirty="0" smtClean="0"/>
-              <a:t>It </a:t>
-            </a:r>
-            <a:r>
               <a:rPr lang="en-US" sz="3100" dirty="0"/>
-              <a:t>all starts with YOU!</a:t>
+              <a:t>(remember, Jerry got his own page)</a:t>
             </a:r>
           </a:p>
           <a:p>
@@ -8393,7 +8579,7 @@
           <p:nvPr/>
         </p:nvPicPr>
         <p:blipFill>
-          <a:blip r:embed="rId2"/>
+          <a:blip r:embed="rId3"/>
           <a:stretch>
             <a:fillRect/>
           </a:stretch>
@@ -8402,6 +8588,36 @@
           <a:xfrm>
             <a:off x="81934" y="6318422"/>
             <a:ext cx="437051" cy="301415"/>
+          </a:xfrm>
+          <a:prstGeom prst="rect">
+            <a:avLst/>
+          </a:prstGeom>
+        </p:spPr>
+      </p:pic>
+      <p:pic>
+        <p:nvPicPr>
+          <p:cNvPr id="7" name="Picture 6">
+            <a:extLst>
+              <a:ext uri="{FF2B5EF4-FFF2-40B4-BE49-F238E27FC236}">
+                <a16:creationId xmlns:a16="http://schemas.microsoft.com/office/drawing/2014/main" id="{9CE0AB2B-E57C-48A5-B8A2-060666DFEE80}"/>
+              </a:ext>
+            </a:extLst>
+          </p:cNvPr>
+          <p:cNvPicPr>
+            <a:picLocks noChangeAspect="1"/>
+          </p:cNvPicPr>
+          <p:nvPr/>
+        </p:nvPicPr>
+        <p:blipFill>
+          <a:blip r:embed="rId3"/>
+          <a:stretch>
+            <a:fillRect/>
+          </a:stretch>
+        </p:blipFill>
+        <p:spPr>
+          <a:xfrm>
+            <a:off x="3650394" y="1034684"/>
+            <a:ext cx="909196" cy="627033"/>
           </a:xfrm>
           <a:prstGeom prst="rect">
             <a:avLst/>
@@ -8440,6 +8656,240 @@
       </p:grpSpPr>
       <p:sp>
         <p:nvSpPr>
+          <p:cNvPr id="2" name="Title 1">
+            <a:extLst>
+              <a:ext uri="{FF2B5EF4-FFF2-40B4-BE49-F238E27FC236}">
+                <a16:creationId xmlns:a16="http://schemas.microsoft.com/office/drawing/2014/main" id="{15897EB4-928B-499B-AE96-0FB6071C79F6}"/>
+              </a:ext>
+            </a:extLst>
+          </p:cNvPr>
+          <p:cNvSpPr>
+            <a:spLocks noGrp="1"/>
+          </p:cNvSpPr>
+          <p:nvPr>
+            <p:ph type="title"/>
+          </p:nvPr>
+        </p:nvSpPr>
+        <p:spPr/>
+        <p:txBody>
+          <a:bodyPr/>
+          <a:lstStyle/>
+          <a:p>
+            <a:r>
+              <a:rPr lang="en-US" dirty="0"/>
+              <a:t>WHAT WOULD YOU DO?</a:t>
+            </a:r>
+          </a:p>
+        </p:txBody>
+      </p:sp>
+      <p:sp>
+        <p:nvSpPr>
+          <p:cNvPr id="4" name="TextBox 3">
+            <a:extLst>
+              <a:ext uri="{FF2B5EF4-FFF2-40B4-BE49-F238E27FC236}">
+                <a16:creationId xmlns:a16="http://schemas.microsoft.com/office/drawing/2014/main" id="{D8209725-78A1-4B7B-BB69-4318C7DB1317}"/>
+              </a:ext>
+            </a:extLst>
+          </p:cNvPr>
+          <p:cNvSpPr txBox="1"/>
+          <p:nvPr/>
+        </p:nvSpPr>
+        <p:spPr>
+          <a:xfrm>
+            <a:off x="829887" y="2077883"/>
+            <a:ext cx="10532226" cy="3908762"/>
+          </a:xfrm>
+          <a:prstGeom prst="rect">
+            <a:avLst/>
+          </a:prstGeom>
+          <a:noFill/>
+        </p:spPr>
+        <p:txBody>
+          <a:bodyPr wrap="square" rtlCol="0">
+            <a:spAutoFit/>
+          </a:bodyPr>
+          <a:lstStyle/>
+          <a:p>
+            <a:pPr marL="457200" indent="-457200">
+              <a:buFont typeface="Arial" panose="020B0604020202020204" pitchFamily="34" charset="0"/>
+              <a:buChar char="•"/>
+            </a:pPr>
+            <a:r>
+              <a:rPr lang="en-US" sz="3100" dirty="0"/>
+              <a:t>Poll the audience</a:t>
+            </a:r>
+          </a:p>
+          <a:p>
+            <a:pPr marL="457200" indent="-457200">
+              <a:buFont typeface="Arial" panose="020B0604020202020204" pitchFamily="34" charset="0"/>
+              <a:buChar char="•"/>
+            </a:pPr>
+            <a:r>
+              <a:rPr lang="en-US" sz="3100" dirty="0"/>
+              <a:t>It’s not me, it’s YOU!</a:t>
+            </a:r>
+          </a:p>
+          <a:p>
+            <a:pPr marL="457200" indent="-457200">
+              <a:buFont typeface="Arial" panose="020B0604020202020204" pitchFamily="34" charset="0"/>
+              <a:buChar char="•"/>
+            </a:pPr>
+            <a:r>
+              <a:rPr lang="en-US" sz="3100" dirty="0"/>
+              <a:t>Are you like me?</a:t>
+            </a:r>
+          </a:p>
+          <a:p>
+            <a:pPr marL="457200" indent="-457200">
+              <a:buFont typeface="Arial" panose="020B0604020202020204" pitchFamily="34" charset="0"/>
+              <a:buChar char="•"/>
+            </a:pPr>
+            <a:r>
+              <a:rPr lang="en-US" sz="3100" dirty="0"/>
+              <a:t>Team Up?</a:t>
+            </a:r>
+          </a:p>
+          <a:p>
+            <a:pPr marL="457200" indent="-457200">
+              <a:buFont typeface="Arial" panose="020B0604020202020204" pitchFamily="34" charset="0"/>
+              <a:buChar char="•"/>
+            </a:pPr>
+            <a:r>
+              <a:rPr lang="en-US" sz="3100" dirty="0"/>
+              <a:t>It all starts with YOU!</a:t>
+            </a:r>
+          </a:p>
+          <a:p>
+            <a:pPr marL="914400" lvl="1" indent="-457200">
+              <a:buFont typeface="Arial" panose="020B0604020202020204" pitchFamily="34" charset="0"/>
+              <a:buChar char="•"/>
+            </a:pPr>
+            <a:r>
+              <a:rPr lang="en-US" sz="3100" dirty="0"/>
+              <a:t>Blogging?</a:t>
+            </a:r>
+          </a:p>
+          <a:p>
+            <a:pPr marL="914400" lvl="1" indent="-457200">
+              <a:buFont typeface="Arial" panose="020B0604020202020204" pitchFamily="34" charset="0"/>
+              <a:buChar char="•"/>
+            </a:pPr>
+            <a:r>
+              <a:rPr lang="en-US" sz="3100" dirty="0"/>
+              <a:t>Repos?</a:t>
+            </a:r>
+          </a:p>
+          <a:p>
+            <a:pPr marL="457200" indent="-457200">
+              <a:buFont typeface="Arial" panose="020B0604020202020204" pitchFamily="34" charset="0"/>
+              <a:buChar char="•"/>
+            </a:pPr>
+            <a:endParaRPr lang="en-US" sz="3100" dirty="0"/>
+          </a:p>
+        </p:txBody>
+      </p:sp>
+      <p:sp>
+        <p:nvSpPr>
+          <p:cNvPr id="5" name="TextBox 4">
+            <a:extLst>
+              <a:ext uri="{FF2B5EF4-FFF2-40B4-BE49-F238E27FC236}">
+                <a16:creationId xmlns:a16="http://schemas.microsoft.com/office/drawing/2014/main" id="{5939B7F2-B094-4A61-A37A-BABADA1FF051}"/>
+              </a:ext>
+            </a:extLst>
+          </p:cNvPr>
+          <p:cNvSpPr txBox="1"/>
+          <p:nvPr/>
+        </p:nvSpPr>
+        <p:spPr>
+          <a:xfrm>
+            <a:off x="518985" y="6334898"/>
+            <a:ext cx="1933543" cy="369332"/>
+          </a:xfrm>
+          <a:prstGeom prst="rect">
+            <a:avLst/>
+          </a:prstGeom>
+          <a:noFill/>
+        </p:spPr>
+        <p:txBody>
+          <a:bodyPr wrap="none" rtlCol="0">
+            <a:spAutoFit/>
+          </a:bodyPr>
+          <a:lstStyle/>
+          <a:p>
+            <a:r>
+              <a:rPr lang="en-US" dirty="0"/>
+              <a:t>@</a:t>
+            </a:r>
+            <a:r>
+              <a:rPr lang="en-US" dirty="0" err="1"/>
+              <a:t>SpilledMilkCOM</a:t>
+            </a:r>
+            <a:endParaRPr lang="en-US" dirty="0"/>
+          </a:p>
+        </p:txBody>
+      </p:sp>
+      <p:pic>
+        <p:nvPicPr>
+          <p:cNvPr id="6" name="Picture 5">
+            <a:extLst>
+              <a:ext uri="{FF2B5EF4-FFF2-40B4-BE49-F238E27FC236}">
+                <a16:creationId xmlns:a16="http://schemas.microsoft.com/office/drawing/2014/main" id="{8C485CEF-569C-4E99-A23A-7BBB2DA3B4D3}"/>
+              </a:ext>
+            </a:extLst>
+          </p:cNvPr>
+          <p:cNvPicPr>
+            <a:picLocks noChangeAspect="1"/>
+          </p:cNvPicPr>
+          <p:nvPr/>
+        </p:nvPicPr>
+        <p:blipFill>
+          <a:blip r:embed="rId2"/>
+          <a:stretch>
+            <a:fillRect/>
+          </a:stretch>
+        </p:blipFill>
+        <p:spPr>
+          <a:xfrm>
+            <a:off x="81934" y="6318422"/>
+            <a:ext cx="437051" cy="301415"/>
+          </a:xfrm>
+          <a:prstGeom prst="rect">
+            <a:avLst/>
+          </a:prstGeom>
+        </p:spPr>
+      </p:pic>
+    </p:spTree>
+    <p:extLst>
+      <p:ext uri="{BB962C8B-B14F-4D97-AF65-F5344CB8AC3E}">
+        <p14:creationId xmlns:p14="http://schemas.microsoft.com/office/powerpoint/2010/main" val="3753542739"/>
+      </p:ext>
+    </p:extLst>
+  </p:cSld>
+  <p:clrMapOvr>
+    <a:masterClrMapping/>
+  </p:clrMapOvr>
+</p:sld>
+</file>
+
+<file path=ppt/slides/slide19.xml><?xml version="1.0" encoding="utf-8"?>
+<p:sld xmlns:a="http://schemas.openxmlformats.org/drawingml/2006/main" xmlns:r="http://schemas.openxmlformats.org/officeDocument/2006/relationships" xmlns:p="http://schemas.openxmlformats.org/presentationml/2006/main">
+  <p:cSld>
+    <p:spTree>
+      <p:nvGrpSpPr>
+        <p:cNvPr id="1" name=""/>
+        <p:cNvGrpSpPr/>
+        <p:nvPr/>
+      </p:nvGrpSpPr>
+      <p:grpSpPr>
+        <a:xfrm>
+          <a:off x="0" y="0"/>
+          <a:ext cx="0" cy="0"/>
+          <a:chOff x="0" y="0"/>
+          <a:chExt cx="0" cy="0"/>
+        </a:xfrm>
+      </p:grpSpPr>
+      <p:sp>
+        <p:nvSpPr>
           <p:cNvPr id="2" name="Title 1"/>
           <p:cNvSpPr>
             <a:spLocks noGrp="1"/>
@@ -9381,12 +9831,8 @@
           <a:lstStyle/>
           <a:p>
             <a:r>
-              <a:rPr lang="en-US" dirty="0" smtClean="0"/>
-              <a:t>ALOHA: </a:t>
-            </a:r>
-            <a:r>
               <a:rPr lang="en-US" dirty="0"/>
-              <a:t>My name is</a:t>
+              <a:t>ALOHA: My name is</a:t>
             </a:r>
             <a:br>
               <a:rPr lang="en-US" dirty="0"/>
@@ -9622,7 +10068,12 @@
             <p:ph type="title"/>
           </p:nvPr>
         </p:nvSpPr>
-        <p:spPr/>
+        <p:spPr>
+          <a:xfrm>
+            <a:off x="913775" y="618517"/>
+            <a:ext cx="10364451" cy="1143781"/>
+          </a:xfrm>
+        </p:spPr>
         <p:txBody>
           <a:bodyPr/>
           <a:lstStyle/>
@@ -9642,8 +10093,8 @@
         </p:nvSpPr>
         <p:spPr>
           <a:xfrm>
-            <a:off x="839585" y="2044931"/>
-            <a:ext cx="10532226" cy="4031873"/>
+            <a:off x="829887" y="1629295"/>
+            <a:ext cx="10532226" cy="4524315"/>
           </a:xfrm>
           <a:prstGeom prst="rect">
             <a:avLst/>
@@ -9662,7 +10113,7 @@
             </a:pPr>
             <a:r>
               <a:rPr lang="en-US" sz="3200" dirty="0"/>
-              <a:t>Goals</a:t>
+              <a:t>Backstory for inspiration (already happened)</a:t>
             </a:r>
           </a:p>
           <a:p>
@@ -9672,7 +10123,7 @@
             </a:pPr>
             <a:r>
               <a:rPr lang="en-US" sz="3200" dirty="0"/>
-              <a:t>What this is NOT!</a:t>
+              <a:t>Goals</a:t>
             </a:r>
           </a:p>
           <a:p>
@@ -9682,7 +10133,7 @@
             </a:pPr>
             <a:r>
               <a:rPr lang="en-US" sz="3200" dirty="0"/>
-              <a:t>Me, Me, Me</a:t>
+              <a:t>What this is NOT!</a:t>
             </a:r>
           </a:p>
           <a:p>
@@ -9692,7 +10143,7 @@
             </a:pPr>
             <a:r>
               <a:rPr lang="en-US" sz="3200" dirty="0"/>
-              <a:t>WWJD?</a:t>
+              <a:t>Me, Me, Me</a:t>
             </a:r>
           </a:p>
           <a:p>
@@ -9702,7 +10153,7 @@
             </a:pPr>
             <a:r>
               <a:rPr lang="en-US" sz="3200" dirty="0"/>
-              <a:t>What would YOU do?</a:t>
+              <a:t>UWP Community Toolkit (tiny contributions)</a:t>
             </a:r>
           </a:p>
           <a:p>
@@ -9712,7 +10163,17 @@
             </a:pPr>
             <a:r>
               <a:rPr lang="en-US" sz="3200" dirty="0"/>
-              <a:t>UWP Community Toolkit (tiny contributions)</a:t>
+              <a:t>WWJD?</a:t>
+            </a:r>
+          </a:p>
+          <a:p>
+            <a:pPr marL="457200" indent="-457200">
+              <a:buFont typeface="Arial" panose="020B0604020202020204" pitchFamily="34" charset="0"/>
+              <a:buChar char="•"/>
+            </a:pPr>
+            <a:r>
+              <a:rPr lang="en-US" sz="3200" dirty="0"/>
+              <a:t>What would YOU do?</a:t>
             </a:r>
           </a:p>
           <a:p>
@@ -10304,7 +10765,7 @@
             </a:pPr>
             <a:r>
               <a:rPr lang="en-US" sz="3100" dirty="0"/>
-              <a:t>Not enough time</a:t>
+              <a:t>Not enough time in the day</a:t>
             </a:r>
           </a:p>
           <a:p>

</xml_diff>